<commit_message>
chore: Prject work Btree optimiztions
</commit_message>
<xml_diff>
--- a/Проекттная работа BTree индексы.pptx
+++ b/Проекттная работа BTree индексы.pptx
@@ -5,7 +5,7 @@
     <p:sldMasterId id="2147483648" r:id="rId1"/>
   </p:sldMasterIdLst>
   <p:notesMasterIdLst>
-    <p:notesMasterId r:id="rId17"/>
+    <p:notesMasterId r:id="rId11"/>
   </p:notesMasterIdLst>
   <p:sldIdLst>
     <p:sldId id="256" r:id="rId2"/>
@@ -13,16 +13,10 @@
     <p:sldId id="258" r:id="rId4"/>
     <p:sldId id="259" r:id="rId5"/>
     <p:sldId id="260" r:id="rId6"/>
-    <p:sldId id="262" r:id="rId7"/>
-    <p:sldId id="263" r:id="rId8"/>
-    <p:sldId id="264" r:id="rId9"/>
-    <p:sldId id="265" r:id="rId10"/>
-    <p:sldId id="266" r:id="rId11"/>
-    <p:sldId id="267" r:id="rId12"/>
-    <p:sldId id="268" r:id="rId13"/>
-    <p:sldId id="269" r:id="rId14"/>
-    <p:sldId id="274" r:id="rId15"/>
-    <p:sldId id="272" r:id="rId16"/>
+    <p:sldId id="261" r:id="rId7"/>
+    <p:sldId id="262" r:id="rId8"/>
+    <p:sldId id="263" r:id="rId9"/>
+    <p:sldId id="264" r:id="rId10"/>
   </p:sldIdLst>
   <p:sldSz cx="13004800" cy="9753600"/>
   <p:notesSz cx="6858000" cy="9144000"/>
@@ -3259,765 +3253,45 @@
           </p:nvPr>
         </p:nvSpPr>
         <p:spPr>
-          <a:prstGeom prst="rect">
-            <a:avLst/>
-          </a:prstGeom>
-        </p:spPr>
-        <p:txBody>
-          <a:bodyPr/>
-          <a:lstStyle/>
-          <a:p>
-            <a:r>
-              <a:rPr>
-                <a:latin typeface="Arial" pitchFamily="34" charset="0"/>
-                <a:cs typeface="Arial" pitchFamily="34" charset="0"/>
-              </a:rPr>
-              <a:t>Проекты</a:t>
-            </a:r>
-          </a:p>
-        </p:txBody>
-      </p:sp>
-      <p:sp>
-        <p:nvSpPr>
-          <p:cNvPr id="120" name="Алгоритмы-2018/12"/>
-          <p:cNvSpPr txBox="1">
-            <a:spLocks noGrp="1"/>
-          </p:cNvSpPr>
-          <p:nvPr>
-            <p:ph type="subTitle" sz="quarter" idx="1"/>
-          </p:nvPr>
-        </p:nvSpPr>
-        <p:spPr>
-          <a:prstGeom prst="rect">
-            <a:avLst/>
-          </a:prstGeom>
-        </p:spPr>
-        <p:txBody>
-          <a:bodyPr/>
-          <a:lstStyle/>
-          <a:p>
-            <a:r>
-              <a:rPr>
-                <a:latin typeface="Arial" pitchFamily="34" charset="0"/>
-                <a:cs typeface="Arial" pitchFamily="34" charset="0"/>
-              </a:rPr>
-              <a:t>Алгоритмы</a:t>
-            </a:r>
-          </a:p>
-        </p:txBody>
-      </p:sp>
-    </p:spTree>
-  </p:cSld>
-  <p:clrMapOvr>
-    <a:masterClrMapping/>
-  </p:clrMapOvr>
-  <p:transition spd="med"/>
-</p:sld>
-</file>
-
-<file path=ppt/slides/slide10.xml><?xml version="1.0" encoding="utf-8"?>
-<p:sld xmlns:a="http://schemas.openxmlformats.org/drawingml/2006/main" xmlns:r="http://schemas.openxmlformats.org/officeDocument/2006/relationships" xmlns:p="http://schemas.openxmlformats.org/presentationml/2006/main">
-  <p:cSld>
-    <p:spTree>
-      <p:nvGrpSpPr>
-        <p:cNvPr id="1" name=""/>
-        <p:cNvGrpSpPr/>
-        <p:nvPr/>
-      </p:nvGrpSpPr>
-      <p:grpSpPr>
-        <a:xfrm>
-          <a:off x="0" y="0"/>
-          <a:ext cx="0" cy="0"/>
-          <a:chOff x="0" y="0"/>
-          <a:chExt cx="0" cy="0"/>
-        </a:xfrm>
-      </p:grpSpPr>
-      <p:sp>
-        <p:nvSpPr>
-          <p:cNvPr id="149" name="Индексы для СУБД"/>
-          <p:cNvSpPr txBox="1">
-            <a:spLocks noGrp="1"/>
-          </p:cNvSpPr>
-          <p:nvPr>
-            <p:ph type="title"/>
-          </p:nvPr>
-        </p:nvSpPr>
-        <p:spPr>
-          <a:prstGeom prst="rect">
-            <a:avLst/>
-          </a:prstGeom>
-        </p:spPr>
-        <p:txBody>
-          <a:bodyPr/>
-          <a:lstStyle/>
-          <a:p>
-            <a:r>
-              <a:rPr>
-                <a:latin typeface="Arial" pitchFamily="34" charset="0"/>
-                <a:cs typeface="Arial" pitchFamily="34" charset="0"/>
-              </a:rPr>
-              <a:t>Индексы для СУБД</a:t>
-            </a:r>
-          </a:p>
-        </p:txBody>
-      </p:sp>
-      <p:sp>
-        <p:nvSpPr>
-          <p:cNvPr id="150" name="Можно реализовать один из индексов: B-Tree, LSM…"/>
-          <p:cNvSpPr txBox="1">
-            <a:spLocks noGrp="1"/>
-          </p:cNvSpPr>
-          <p:nvPr>
-            <p:ph type="body" idx="1"/>
-          </p:nvPr>
-        </p:nvSpPr>
-        <p:spPr>
-          <a:prstGeom prst="rect">
-            <a:avLst/>
-          </a:prstGeom>
-        </p:spPr>
-        <p:txBody>
-          <a:bodyPr/>
-          <a:lstStyle/>
-          <a:p>
-            <a:pPr marL="324484" indent="-324484" defTabSz="426466">
-              <a:spcBef>
-                <a:spcPts val="3000"/>
-              </a:spcBef>
-              <a:defRPr sz="2300"/>
-            </a:pPr>
-            <a:r>
-              <a:rPr>
-                <a:latin typeface="+mj-lt"/>
-              </a:rPr>
-              <a:t>Можно реализовать один из индексов: B-Tree, LSM</a:t>
-            </a:r>
-          </a:p>
-          <a:p>
-            <a:pPr marL="324484" indent="-324484" defTabSz="426466">
-              <a:spcBef>
-                <a:spcPts val="3000"/>
-              </a:spcBef>
-              <a:defRPr sz="2300"/>
-            </a:pPr>
-            <a:r>
-              <a:rPr>
-                <a:latin typeface="+mj-lt"/>
-              </a:rPr>
-              <a:t>Подробнее про LSM: “LSM-деревья (Log-structured merge-tree). Идея в том, что у LSM дерева есть несколько уровней хранения увеличивающихся размеров, первый (нулевой, он же memtable) из которых лежит в памяти, а остальные лежат на диске. Каждый уровень представляет собой дерево или список деревьев, и у каждого уровня есть растущий (обычно в 10 раз на уровень) лимит размера. Вставка производится сначала в нулевой уровень, при переполнении он сбрасывается в первый, при переполнении первого — попадает во второй… И так далее. Вставки получаются быстрые, так как не нужно мучаться с перезаписью отдельных мелких блоков данных. Однако зато мы, во-первых, имеем неслабый write amplification, а во-вторых — при поиске значений должны просматривать все деревья (что не круто). С первым ничего не поделаешь, а со вторым борются поддержанием в памяти bloom-фильтров, посмотрев в которые, можно сказать, в каких деревьях данных точно НЕТ, а в каких они МОГУТ БЫТЬ.”</a:t>
-            </a:r>
-          </a:p>
-        </p:txBody>
-      </p:sp>
-    </p:spTree>
-  </p:cSld>
-  <p:clrMapOvr>
-    <a:masterClrMapping/>
-  </p:clrMapOvr>
-  <p:transition spd="med"/>
-</p:sld>
-</file>
-
-<file path=ppt/slides/slide11.xml><?xml version="1.0" encoding="utf-8"?>
-<p:sld xmlns:a="http://schemas.openxmlformats.org/drawingml/2006/main" xmlns:r="http://schemas.openxmlformats.org/officeDocument/2006/relationships" xmlns:p="http://schemas.openxmlformats.org/presentationml/2006/main">
-  <p:cSld>
-    <p:spTree>
-      <p:nvGrpSpPr>
-        <p:cNvPr id="1" name=""/>
-        <p:cNvGrpSpPr/>
-        <p:nvPr/>
-      </p:nvGrpSpPr>
-      <p:grpSpPr>
-        <a:xfrm>
-          <a:off x="0" y="0"/>
-          <a:ext cx="0" cy="0"/>
-          <a:chOff x="0" y="0"/>
-          <a:chExt cx="0" cy="0"/>
-        </a:xfrm>
-      </p:grpSpPr>
-      <p:sp>
-        <p:nvSpPr>
-          <p:cNvPr id="152" name="База хешей и расстояние Хэмминга"/>
-          <p:cNvSpPr txBox="1">
-            <a:spLocks noGrp="1"/>
-          </p:cNvSpPr>
-          <p:nvPr>
-            <p:ph type="title"/>
-          </p:nvPr>
-        </p:nvSpPr>
-        <p:spPr>
-          <a:prstGeom prst="rect">
-            <a:avLst/>
-          </a:prstGeom>
-        </p:spPr>
-        <p:txBody>
-          <a:bodyPr/>
-          <a:lstStyle>
-            <a:lvl1pPr defTabSz="484886">
-              <a:defRPr sz="6600"/>
-            </a:lvl1pPr>
-          </a:lstStyle>
-          <a:p>
-            <a:r>
-              <a:rPr>
-                <a:latin typeface="Arial" pitchFamily="34" charset="0"/>
-                <a:cs typeface="Arial" pitchFamily="34" charset="0"/>
-              </a:rPr>
-              <a:t>База хешей и расстояние Хэмминга</a:t>
-            </a:r>
-          </a:p>
-        </p:txBody>
-      </p:sp>
-      <p:sp>
-        <p:nvSpPr>
-          <p:cNvPr id="153" name="Дано: база бинарных хэшей одного и того же размера, искомый хэш и расстояние.…"/>
-          <p:cNvSpPr txBox="1">
-            <a:spLocks noGrp="1"/>
-          </p:cNvSpPr>
-          <p:nvPr>
-            <p:ph type="body" idx="1"/>
-          </p:nvPr>
-        </p:nvSpPr>
-        <p:spPr>
-          <a:prstGeom prst="rect">
-            <a:avLst/>
-          </a:prstGeom>
-        </p:spPr>
-        <p:txBody>
-          <a:bodyPr/>
-          <a:lstStyle/>
-          <a:p>
-            <a:r>
-              <a:rPr>
-                <a:latin typeface="+mj-lt"/>
-              </a:rPr>
-              <a:t>Дано: база бинарных хэшей одного и того же размера, искомый хэш и расстояние.</a:t>
-            </a:r>
-          </a:p>
-          <a:p>
-            <a:r>
-              <a:rPr>
-                <a:latin typeface="+mj-lt"/>
-              </a:rPr>
-              <a:t>Нужно найти все хэши, отстоящие от заданного не более, чем на расстояние</a:t>
-            </a:r>
-          </a:p>
-        </p:txBody>
-      </p:sp>
-    </p:spTree>
-  </p:cSld>
-  <p:clrMapOvr>
-    <a:masterClrMapping/>
-  </p:clrMapOvr>
-  <p:transition spd="med"/>
-</p:sld>
-</file>
-
-<file path=ppt/slides/slide12.xml><?xml version="1.0" encoding="utf-8"?>
-<p:sld xmlns:a="http://schemas.openxmlformats.org/drawingml/2006/main" xmlns:r="http://schemas.openxmlformats.org/officeDocument/2006/relationships" xmlns:p="http://schemas.openxmlformats.org/presentationml/2006/main">
-  <p:cSld>
-    <p:spTree>
-      <p:nvGrpSpPr>
-        <p:cNvPr id="1" name=""/>
-        <p:cNvGrpSpPr/>
-        <p:nvPr/>
-      </p:nvGrpSpPr>
-      <p:grpSpPr>
-        <a:xfrm>
-          <a:off x="0" y="0"/>
-          <a:ext cx="0" cy="0"/>
-          <a:chOff x="0" y="0"/>
-          <a:chExt cx="0" cy="0"/>
-        </a:xfrm>
-      </p:grpSpPr>
-      <p:sp>
-        <p:nvSpPr>
-          <p:cNvPr id="155" name="База хешей и расстояние Хэмминга"/>
-          <p:cNvSpPr txBox="1">
-            <a:spLocks noGrp="1"/>
-          </p:cNvSpPr>
-          <p:nvPr>
-            <p:ph type="title"/>
-          </p:nvPr>
-        </p:nvSpPr>
-        <p:spPr>
-          <a:prstGeom prst="rect">
-            <a:avLst/>
-          </a:prstGeom>
-        </p:spPr>
-        <p:txBody>
-          <a:bodyPr/>
-          <a:lstStyle>
-            <a:lvl1pPr defTabSz="484886">
-              <a:defRPr sz="6600"/>
-            </a:lvl1pPr>
-          </a:lstStyle>
-          <a:p>
-            <a:r>
-              <a:rPr>
-                <a:latin typeface="Arial" pitchFamily="34" charset="0"/>
-                <a:cs typeface="Arial" pitchFamily="34" charset="0"/>
-              </a:rPr>
-              <a:t>База хешей и расстояние Хэмминга</a:t>
-            </a:r>
-          </a:p>
-        </p:txBody>
-      </p:sp>
-      <p:sp>
-        <p:nvSpPr>
-          <p:cNvPr id="156" name="Однако, есть алгоритм “мульти-индекс“, решающий эту задачу быстрее.…"/>
-          <p:cNvSpPr txBox="1">
-            <a:spLocks noGrp="1"/>
-          </p:cNvSpPr>
-          <p:nvPr>
-            <p:ph type="body" idx="1"/>
-          </p:nvPr>
-        </p:nvSpPr>
-        <p:spPr>
+          <a:xfrm>
+            <a:off x="1270000" y="2514600"/>
+            <a:ext cx="10464800" cy="3302000"/>
+          </a:xfrm>
           <a:prstGeom prst="rect">
             <a:avLst/>
           </a:prstGeom>
         </p:spPr>
         <p:txBody>
           <a:bodyPr>
-            <a:normAutofit lnSpcReduction="10000"/>
+            <a:normAutofit fontScale="90000"/>
           </a:bodyPr>
           <a:lstStyle/>
           <a:p>
             <a:r>
-              <a:rPr>
-                <a:latin typeface="+mj-lt"/>
-              </a:rPr>
-              <a:t>Однако, есть алгоритм “мульти-индекс“, решающий эту задачу быстрее.</a:t>
-            </a:r>
-          </a:p>
-          <a:p>
-            <a:r>
-              <a:rPr>
-                <a:latin typeface="+mj-lt"/>
-              </a:rPr>
-              <a:t>Презентация для ознакомления: https://norouzi.github.io/research/posters/mih_poster.pdf</a:t>
-            </a:r>
-          </a:p>
-          <a:p>
-            <a:r>
-              <a:rPr>
-                <a:latin typeface="+mj-lt"/>
-              </a:rPr>
-              <a:t>Основная статья для ознакомления: https://www.cs.toronto.edu/~norouzi/research/papers/multi_index_hashing.pdf</a:t>
-            </a:r>
-          </a:p>
-          <a:p>
-            <a:r>
-              <a:rPr>
-                <a:latin typeface="+mj-lt"/>
-              </a:rPr>
-              <a:t>и его улучшенная версия: http://pages.di.unipi.it/rossano/wp-content/uploads/sites/7/2016/05/sigir16b.pdf</a:t>
-            </a:r>
-          </a:p>
-        </p:txBody>
-      </p:sp>
-    </p:spTree>
-  </p:cSld>
-  <p:clrMapOvr>
-    <a:masterClrMapping/>
-  </p:clrMapOvr>
-  <p:transition spd="med"/>
-</p:sld>
-</file>
-
-<file path=ppt/slides/slide13.xml><?xml version="1.0" encoding="utf-8"?>
-<p:sld xmlns:a="http://schemas.openxmlformats.org/drawingml/2006/main" xmlns:r="http://schemas.openxmlformats.org/officeDocument/2006/relationships" xmlns:p="http://schemas.openxmlformats.org/presentationml/2006/main">
-  <p:cSld>
-    <p:spTree>
-      <p:nvGrpSpPr>
-        <p:cNvPr id="1" name=""/>
-        <p:cNvGrpSpPr/>
-        <p:nvPr/>
-      </p:nvGrpSpPr>
-      <p:grpSpPr>
-        <a:xfrm>
-          <a:off x="0" y="0"/>
-          <a:ext cx="0" cy="0"/>
-          <a:chOff x="0" y="0"/>
-          <a:chExt cx="0" cy="0"/>
-        </a:xfrm>
-      </p:grpSpPr>
-      <p:sp>
-        <p:nvSpPr>
-          <p:cNvPr id="158" name="База хешей и расстояние Хэмминга"/>
-          <p:cNvSpPr txBox="1">
-            <a:spLocks noGrp="1"/>
-          </p:cNvSpPr>
-          <p:nvPr>
-            <p:ph type="title"/>
-          </p:nvPr>
-        </p:nvSpPr>
-        <p:spPr>
-          <a:prstGeom prst="rect">
-            <a:avLst/>
-          </a:prstGeom>
-        </p:spPr>
-        <p:txBody>
-          <a:bodyPr/>
-          <a:lstStyle>
-            <a:lvl1pPr defTabSz="484886">
-              <a:defRPr sz="6600"/>
-            </a:lvl1pPr>
-          </a:lstStyle>
-          <a:p>
-            <a:r>
-              <a:rPr>
+              <a:rPr lang="ru-RU" dirty="0">
                 <a:latin typeface="Arial" pitchFamily="34" charset="0"/>
                 <a:cs typeface="Arial" pitchFamily="34" charset="0"/>
               </a:rPr>
-              <a:t>База хешей и расстояние Хэмминга</a:t>
-            </a:r>
-          </a:p>
-        </p:txBody>
-      </p:sp>
-      <p:sp>
-        <p:nvSpPr>
-          <p:cNvPr id="159" name="Идея алгоритма: каждый элемент датасета (то есть в нашем случае это хеши) разбивается на части (например, на байты), по которым отдельно строятся индексы, запрос разбивается на такие же части, затем производится поиск похожих по отдельным частям (пространство перебора гораздо меньше – самих данных меньше и расстояние ищется меньшее: профит) и результаты объединяются, затем удаляются лишние результаты (false positives появляются из-за особенностей алгоритма).…"/>
-          <p:cNvSpPr txBox="1">
-            <a:spLocks noGrp="1"/>
-          </p:cNvSpPr>
-          <p:nvPr>
-            <p:ph type="body" idx="1"/>
-          </p:nvPr>
-        </p:nvSpPr>
-        <p:spPr>
-          <a:prstGeom prst="rect">
-            <a:avLst/>
-          </a:prstGeom>
-        </p:spPr>
-        <p:txBody>
-          <a:bodyPr/>
-          <a:lstStyle/>
-          <a:p>
-            <a:pPr marL="377825" indent="-377825" defTabSz="496569">
-              <a:spcBef>
-                <a:spcPts val="3500"/>
-              </a:spcBef>
-              <a:defRPr sz="2700"/>
-            </a:pPr>
-            <a:r>
-              <a:rPr>
-                <a:latin typeface="+mj-lt"/>
-              </a:rPr>
-              <a:t>Идея алгоритма: каждый элемент датасета (то есть в нашем случае это хеши) разбивается на части (например, на байты), по которым отдельно строятся индексы, запрос разбивается на такие же части, затем производится поиск похожих по отдельным частям (пространство перебора гораздо меньше – самих данных меньше и расстояние ищется меньшее: профит) и результаты объединяются, затем удаляются лишние результаты (false positives появляются из-за особенностей алгоритма).</a:t>
-            </a:r>
-          </a:p>
-          <a:p>
-            <a:pPr marL="377825" indent="-377825" defTabSz="496569">
-              <a:spcBef>
-                <a:spcPts val="3500"/>
-              </a:spcBef>
-              <a:defRPr sz="2700"/>
-            </a:pPr>
-            <a:r>
-              <a:rPr>
-                <a:latin typeface="+mj-lt"/>
-              </a:rPr>
-              <a:t>Выпускной проект, связанный с вероятностными алгоритмами и структурами данных, в принципе, отличается от соответствующей домашки только обязательностью собственной реализации алгоритма. Подробное описание есть в вебинаре.</a:t>
-            </a:r>
-          </a:p>
-        </p:txBody>
-      </p:sp>
-    </p:spTree>
-  </p:cSld>
-  <p:clrMapOvr>
-    <a:masterClrMapping/>
-  </p:clrMapOvr>
-  <p:transition spd="med"/>
-</p:sld>
-</file>
-
-<file path=ppt/slides/slide14.xml><?xml version="1.0" encoding="utf-8"?>
-<p:sld xmlns:a="http://schemas.openxmlformats.org/drawingml/2006/main" xmlns:r="http://schemas.openxmlformats.org/officeDocument/2006/relationships" xmlns:p="http://schemas.openxmlformats.org/presentationml/2006/main">
-  <p:cSld>
-    <p:spTree>
-      <p:nvGrpSpPr>
-        <p:cNvPr id="1" name=""/>
-        <p:cNvGrpSpPr/>
-        <p:nvPr/>
-      </p:nvGrpSpPr>
-      <p:grpSpPr>
-        <a:xfrm>
-          <a:off x="0" y="0"/>
-          <a:ext cx="0" cy="0"/>
-          <a:chOff x="0" y="0"/>
-          <a:chExt cx="0" cy="0"/>
-        </a:xfrm>
-      </p:grpSpPr>
-      <p:sp>
-        <p:nvSpPr>
-          <p:cNvPr id="2" name="Заголовок 1"/>
-          <p:cNvSpPr>
-            <a:spLocks noGrp="1"/>
-          </p:cNvSpPr>
-          <p:nvPr>
-            <p:ph type="title"/>
-          </p:nvPr>
-        </p:nvSpPr>
-        <p:spPr/>
-        <p:txBody>
-          <a:bodyPr/>
-          <a:lstStyle/>
-          <a:p>
-            <a:r>
-              <a:rPr lang="ru-RU">
+              <a:t>Проектная работа "Индексы для СУБД. B-</a:t>
+            </a:r>
+            <a:r>
+              <a:rPr lang="ru-RU" dirty="0" err="1">
                 <a:latin typeface="Arial" pitchFamily="34" charset="0"/>
                 <a:cs typeface="Arial" pitchFamily="34" charset="0"/>
               </a:rPr>
-              <a:t>Евгений Волосатов</a:t>
-            </a:r>
-            <a:endParaRPr lang="en-US">
+              <a:t>Tree</a:t>
+            </a:r>
+            <a:r>
+              <a:rPr lang="ru-RU" dirty="0">
+                <a:latin typeface="Arial" pitchFamily="34" charset="0"/>
+                <a:cs typeface="Arial" pitchFamily="34" charset="0"/>
+              </a:rPr>
+              <a:t>"</a:t>
+            </a:r>
+            <a:endParaRPr dirty="0">
               <a:latin typeface="Arial" pitchFamily="34" charset="0"/>
               <a:cs typeface="Arial" pitchFamily="34" charset="0"/>
             </a:endParaRPr>
-          </a:p>
-        </p:txBody>
-      </p:sp>
-      <p:sp>
-        <p:nvSpPr>
-          <p:cNvPr id="3" name="Текст 2"/>
-          <p:cNvSpPr>
-            <a:spLocks noGrp="1"/>
-          </p:cNvSpPr>
-          <p:nvPr>
-            <p:ph type="body" idx="1"/>
-          </p:nvPr>
-        </p:nvSpPr>
-        <p:spPr>
-          <a:xfrm>
-            <a:off x="863600" y="2133600"/>
-            <a:ext cx="11099800" cy="6286500"/>
-          </a:xfrm>
-        </p:spPr>
-        <p:txBody>
-          <a:bodyPr>
-            <a:normAutofit fontScale="92500" lnSpcReduction="10000"/>
-          </a:bodyPr>
-          <a:lstStyle/>
-          <a:p>
-            <a:pPr marL="958850" lvl="1" indent="-514350">
-              <a:buFont typeface="+mj-lt"/>
-              <a:buAutoNum type="arabicPeriod"/>
-            </a:pPr>
-            <a:r>
-              <a:rPr lang="ru-RU">
-                <a:latin typeface="+mj-lt"/>
-              </a:rPr>
-              <a:t>Архиватор: </a:t>
-            </a:r>
-            <a:r>
-              <a:rPr lang="en-US">
-                <a:latin typeface="+mj-lt"/>
-              </a:rPr>
-              <a:t>Huffman, LZ77, LZW</a:t>
-            </a:r>
-          </a:p>
-          <a:p>
-            <a:pPr marL="958850" lvl="1" indent="-514350">
-              <a:buFont typeface="+mj-lt"/>
-              <a:buAutoNum type="arabicPeriod"/>
-            </a:pPr>
-            <a:r>
-              <a:rPr lang="ru-RU">
-                <a:latin typeface="+mj-lt"/>
-              </a:rPr>
-              <a:t>Шифратор/дешифратор</a:t>
-            </a:r>
-          </a:p>
-          <a:p>
-            <a:pPr marL="958850" lvl="1" indent="-514350">
-              <a:buFont typeface="+mj-lt"/>
-              <a:buAutoNum type="arabicPeriod"/>
-            </a:pPr>
-            <a:r>
-              <a:rPr lang="ru-RU">
-                <a:latin typeface="+mj-lt"/>
-              </a:rPr>
-              <a:t>Шахматы – мат в 1 ход</a:t>
-            </a:r>
-          </a:p>
-          <a:p>
-            <a:pPr marL="958850" lvl="1" indent="-514350">
-              <a:buFont typeface="+mj-lt"/>
-              <a:buAutoNum type="arabicPeriod"/>
-            </a:pPr>
-            <a:r>
-              <a:rPr lang="ru-RU">
-                <a:latin typeface="+mj-lt"/>
-              </a:rPr>
-              <a:t>Пентамино или Судоку на </a:t>
-            </a:r>
-            <a:r>
-              <a:rPr lang="en-US">
-                <a:latin typeface="+mj-lt"/>
-              </a:rPr>
-              <a:t>Dancing Links</a:t>
-            </a:r>
-          </a:p>
-          <a:p>
-            <a:pPr marL="958850" lvl="1" indent="-514350">
-              <a:buFont typeface="+mj-lt"/>
-              <a:buAutoNum type="arabicPeriod"/>
-            </a:pPr>
-            <a:r>
-              <a:rPr lang="ru-RU">
-                <a:latin typeface="+mj-lt"/>
-              </a:rPr>
-              <a:t>Решение игры Сокобан</a:t>
-            </a:r>
-          </a:p>
-          <a:p>
-            <a:pPr marL="958850" lvl="1" indent="-514350">
-              <a:buFont typeface="+mj-lt"/>
-              <a:buAutoNum type="arabicPeriod"/>
-            </a:pPr>
-            <a:r>
-              <a:rPr lang="ru-RU">
-                <a:latin typeface="+mj-lt"/>
-              </a:rPr>
-              <a:t>Несколько олимпиадных задач – </a:t>
-            </a:r>
-            <a:r>
-              <a:rPr lang="lt-LT">
-                <a:latin typeface="+mj-lt"/>
-              </a:rPr>
-              <a:t>leetcode</a:t>
-            </a:r>
-            <a:endParaRPr lang="ru-RU">
-              <a:latin typeface="+mj-lt"/>
-            </a:endParaRPr>
-          </a:p>
-          <a:p>
-            <a:pPr marL="958850" lvl="1" indent="-514350">
-              <a:buFont typeface="+mj-lt"/>
-              <a:buAutoNum type="arabicPeriod"/>
-            </a:pPr>
-            <a:r>
-              <a:rPr lang="ru-RU">
-                <a:latin typeface="+mj-lt"/>
-              </a:rPr>
-              <a:t>Визуализация алгоритмов сортировки</a:t>
-            </a:r>
-          </a:p>
-        </p:txBody>
-      </p:sp>
-    </p:spTree>
-  </p:cSld>
-  <p:clrMapOvr>
-    <a:masterClrMapping/>
-  </p:clrMapOvr>
-  <p:transition spd="med"/>
-</p:sld>
-</file>
-
-<file path=ppt/slides/slide15.xml><?xml version="1.0" encoding="utf-8"?>
-<p:sld xmlns:a="http://schemas.openxmlformats.org/drawingml/2006/main" xmlns:r="http://schemas.openxmlformats.org/officeDocument/2006/relationships" xmlns:p="http://schemas.openxmlformats.org/presentationml/2006/main">
-  <p:cSld>
-    <p:spTree>
-      <p:nvGrpSpPr>
-        <p:cNvPr id="1" name=""/>
-        <p:cNvGrpSpPr/>
-        <p:nvPr/>
-      </p:nvGrpSpPr>
-      <p:grpSpPr>
-        <a:xfrm>
-          <a:off x="0" y="0"/>
-          <a:ext cx="0" cy="0"/>
-          <a:chOff x="0" y="0"/>
-          <a:chExt cx="0" cy="0"/>
-        </a:xfrm>
-      </p:grpSpPr>
-      <p:sp>
-        <p:nvSpPr>
-          <p:cNvPr id="167" name="Сокобан"/>
-          <p:cNvSpPr txBox="1">
-            <a:spLocks noGrp="1"/>
-          </p:cNvSpPr>
-          <p:nvPr>
-            <p:ph type="title"/>
-          </p:nvPr>
-        </p:nvSpPr>
-        <p:spPr>
-          <a:prstGeom prst="rect">
-            <a:avLst/>
-          </a:prstGeom>
-        </p:spPr>
-        <p:txBody>
-          <a:bodyPr/>
-          <a:lstStyle/>
-          <a:p>
-            <a:r>
-              <a:rPr>
-                <a:latin typeface="Arial" pitchFamily="34" charset="0"/>
-                <a:cs typeface="Arial" pitchFamily="34" charset="0"/>
-              </a:rPr>
-              <a:t>Сокобан</a:t>
-            </a:r>
-          </a:p>
-        </p:txBody>
-      </p:sp>
-      <p:sp>
-        <p:nvSpPr>
-          <p:cNvPr id="168" name="NP-сложная…"/>
-          <p:cNvSpPr txBox="1">
-            <a:spLocks noGrp="1"/>
-          </p:cNvSpPr>
-          <p:nvPr>
-            <p:ph type="body" idx="1"/>
-          </p:nvPr>
-        </p:nvSpPr>
-        <p:spPr>
-          <a:prstGeom prst="rect">
-            <a:avLst/>
-          </a:prstGeom>
-        </p:spPr>
-        <p:txBody>
-          <a:bodyPr/>
-          <a:lstStyle/>
-          <a:p>
-            <a:r>
-              <a:rPr>
-                <a:latin typeface="+mj-lt"/>
-              </a:rPr>
-              <a:t>NP-сложная</a:t>
-            </a:r>
-          </a:p>
-          <a:p>
-            <a:r>
-              <a:rPr>
-                <a:latin typeface="+mj-lt"/>
-              </a:rPr>
-              <a:t>Большой фактор ветвления, глубина задачи</a:t>
-            </a:r>
-          </a:p>
-          <a:p>
-            <a:r>
-              <a:rPr>
-                <a:latin typeface="+mj-lt"/>
-              </a:rPr>
-              <a:t>Сложности составления солвера для задачи </a:t>
-            </a:r>
-            <a:r>
-              <a:rPr u="sng">
-                <a:solidFill>
-                  <a:srgbClr val="0000FF"/>
-                </a:solidFill>
-                <a:uFill>
-                  <a:solidFill>
-                    <a:srgbClr val="0000FF"/>
-                  </a:solidFill>
-                </a:uFill>
-                <a:latin typeface="+mj-lt"/>
-                <a:hlinkClick r:id="rId2"/>
-              </a:rPr>
-              <a:t>https://en.wikipedia.org/wiki/Sokoban#Scientific_research_on_Sokoban</a:t>
-            </a:r>
           </a:p>
         </p:txBody>
       </p:sp>
@@ -4058,21 +3332,38 @@
           </p:nvPr>
         </p:nvSpPr>
         <p:spPr>
+          <a:xfrm>
+            <a:off x="952500" y="254000"/>
+            <a:ext cx="11099800" cy="1270000"/>
+          </a:xfrm>
           <a:prstGeom prst="rect">
             <a:avLst/>
           </a:prstGeom>
         </p:spPr>
         <p:txBody>
-          <a:bodyPr/>
+          <a:bodyPr>
+            <a:normAutofit fontScale="90000"/>
+          </a:bodyPr>
           <a:lstStyle/>
           <a:p>
             <a:r>
-              <a:rPr>
+              <a:rPr lang="en-US" dirty="0">
                 <a:latin typeface="Arial" pitchFamily="34" charset="0"/>
                 <a:cs typeface="Arial" pitchFamily="34" charset="0"/>
               </a:rPr>
-              <a:t>Базовая информация</a:t>
-            </a:r>
+              <a:t>B-</a:t>
+            </a:r>
+            <a:r>
+              <a:rPr lang="ru-RU" dirty="0">
+                <a:latin typeface="Arial" pitchFamily="34" charset="0"/>
+                <a:cs typeface="Arial" pitchFamily="34" charset="0"/>
+              </a:rPr>
+              <a:t>деревья</a:t>
+            </a:r>
+            <a:endParaRPr dirty="0">
+              <a:latin typeface="Arial" pitchFamily="34" charset="0"/>
+              <a:cs typeface="Arial" pitchFamily="34" charset="0"/>
+            </a:endParaRPr>
           </a:p>
         </p:txBody>
       </p:sp>
@@ -4087,33 +3378,132 @@
           </p:nvPr>
         </p:nvSpPr>
         <p:spPr>
+          <a:xfrm>
+            <a:off x="781050" y="2743200"/>
+            <a:ext cx="11099800" cy="4267200"/>
+          </a:xfrm>
           <a:prstGeom prst="rect">
             <a:avLst/>
           </a:prstGeom>
         </p:spPr>
         <p:txBody>
-          <a:bodyPr/>
+          <a:bodyPr>
+            <a:normAutofit fontScale="85000" lnSpcReduction="20000"/>
+          </a:bodyPr>
           <a:lstStyle/>
           <a:p>
             <a:r>
-              <a:rPr>
+              <a:rPr lang="ru-RU" dirty="0">
                 <a:latin typeface="Arial" pitchFamily="34" charset="0"/>
                 <a:cs typeface="Arial" pitchFamily="34" charset="0"/>
               </a:rPr>
-              <a:t>Проект можно делать, а можно не делать. Например, доделывать в течение месяца домашние работы</a:t>
-            </a:r>
-          </a:p>
-          <a:p>
-            <a:r>
-              <a:rPr>
+              <a:t>B-дерево является идеально сбалансированным, то есть глубина всех его листьев одинакова.</a:t>
+            </a:r>
+          </a:p>
+          <a:p>
+            <a:r>
+              <a:rPr lang="ru-RU" dirty="0">
                 <a:latin typeface="Arial" pitchFamily="34" charset="0"/>
                 <a:cs typeface="Arial" pitchFamily="34" charset="0"/>
               </a:rPr>
-              <a:t>Проект, в общем-то, нужен для знаний, если нравится тема, или если хочется добавить что-то интересное в портфолио (на свой GitHub)</a:t>
-            </a:r>
+              <a:t>t — параметр дерева, называемый минимальной степенью B-дерева, не меньший 2. Определяет количество ключей в узлах, а также количество потомков</a:t>
+            </a:r>
+          </a:p>
+          <a:p>
+            <a:r>
+              <a:rPr lang="ru-RU" b="0" i="0" dirty="0">
+                <a:solidFill>
+                  <a:srgbClr val="222222"/>
+                </a:solidFill>
+                <a:effectLst/>
+                <a:latin typeface="Arial" panose="020B0604020202020204" pitchFamily="34" charset="0"/>
+              </a:rPr>
+              <a:t>Ключи в каждом узле упорядочены по </a:t>
+            </a:r>
+            <a:r>
+              <a:rPr lang="ru-RU" b="0" i="0" dirty="0" err="1">
+                <a:solidFill>
+                  <a:srgbClr val="222222"/>
+                </a:solidFill>
+                <a:effectLst/>
+                <a:latin typeface="Arial" panose="020B0604020202020204" pitchFamily="34" charset="0"/>
+              </a:rPr>
+              <a:t>неубыванию</a:t>
+            </a:r>
+            <a:r>
+              <a:rPr lang="ru-RU" b="0" i="0" dirty="0">
+                <a:solidFill>
+                  <a:srgbClr val="222222"/>
+                </a:solidFill>
+                <a:effectLst/>
+                <a:latin typeface="Arial" panose="020B0604020202020204" pitchFamily="34" charset="0"/>
+              </a:rPr>
+              <a:t>.</a:t>
+            </a:r>
+          </a:p>
+          <a:p>
+            <a:r>
+              <a:rPr lang="ru-RU" b="0" i="0" dirty="0">
+                <a:solidFill>
+                  <a:srgbClr val="222222"/>
+                </a:solidFill>
+                <a:effectLst/>
+                <a:latin typeface="Arial" panose="020B0604020202020204" pitchFamily="34" charset="0"/>
+              </a:rPr>
+              <a:t>Все листья находятся на одном уровне.</a:t>
+            </a:r>
+          </a:p>
+          <a:p>
+            <a:endParaRPr lang="ru-RU" b="0" i="0" dirty="0">
+              <a:solidFill>
+                <a:srgbClr val="222222"/>
+              </a:solidFill>
+              <a:effectLst/>
+              <a:latin typeface="Arial" panose="020B0604020202020204" pitchFamily="34" charset="0"/>
+            </a:endParaRPr>
+          </a:p>
+          <a:p>
+            <a:endParaRPr dirty="0">
+              <a:latin typeface="Arial" pitchFamily="34" charset="0"/>
+              <a:cs typeface="Arial" pitchFamily="34" charset="0"/>
+            </a:endParaRPr>
           </a:p>
         </p:txBody>
       </p:sp>
+      <p:pic>
+        <p:nvPicPr>
+          <p:cNvPr id="7" name="Google Shape;1850;p79">
+            <a:extLst>
+              <a:ext uri="{FF2B5EF4-FFF2-40B4-BE49-F238E27FC236}">
+                <a16:creationId xmlns:a16="http://schemas.microsoft.com/office/drawing/2014/main" id="{84418C00-C939-5EBD-C7EE-0BF17795E5FE}"/>
+              </a:ext>
+            </a:extLst>
+          </p:cNvPr>
+          <p:cNvPicPr preferRelativeResize="0"/>
+          <p:nvPr/>
+        </p:nvPicPr>
+        <p:blipFill>
+          <a:blip r:embed="rId2">
+            <a:alphaModFix/>
+          </a:blip>
+          <a:stretch>
+            <a:fillRect/>
+          </a:stretch>
+        </p:blipFill>
+        <p:spPr>
+          <a:xfrm>
+            <a:off x="1473200" y="6248400"/>
+            <a:ext cx="9715500" cy="2725675"/>
+          </a:xfrm>
+          <a:prstGeom prst="rect">
+            <a:avLst/>
+          </a:prstGeom>
+          <a:noFill/>
+          <a:ln>
+            <a:noFill/>
+          </a:ln>
+        </p:spPr>
+      </p:pic>
     </p:spTree>
   </p:cSld>
   <p:clrMapOvr>
@@ -4142,7 +3532,7 @@
       </p:grpSpPr>
       <p:sp>
         <p:nvSpPr>
-          <p:cNvPr id="125" name="Организационное"/>
+          <p:cNvPr id="122" name="Базовая информация"/>
           <p:cNvSpPr txBox="1">
             <a:spLocks noGrp="1"/>
           </p:cNvSpPr>
@@ -4151,27 +3541,84 @@
           </p:nvPr>
         </p:nvSpPr>
         <p:spPr>
+          <a:xfrm>
+            <a:off x="952500" y="254000"/>
+            <a:ext cx="11099800" cy="1270000"/>
+          </a:xfrm>
           <a:prstGeom prst="rect">
             <a:avLst/>
           </a:prstGeom>
         </p:spPr>
         <p:txBody>
-          <a:bodyPr/>
+          <a:bodyPr>
+            <a:normAutofit fontScale="90000"/>
+          </a:bodyPr>
           <a:lstStyle/>
           <a:p>
             <a:r>
-              <a:rPr>
+              <a:rPr lang="en-US" dirty="0">
                 <a:latin typeface="Arial" pitchFamily="34" charset="0"/>
                 <a:cs typeface="Arial" pitchFamily="34" charset="0"/>
               </a:rPr>
-              <a:t>Организационное</a:t>
-            </a:r>
+              <a:t>B-Tree </a:t>
+            </a:r>
+            <a:r>
+              <a:rPr lang="ru-RU" dirty="0">
+                <a:latin typeface="Arial" pitchFamily="34" charset="0"/>
+                <a:cs typeface="Arial" pitchFamily="34" charset="0"/>
+              </a:rPr>
+              <a:t>индекс в БД</a:t>
+            </a:r>
+            <a:endParaRPr dirty="0">
+              <a:latin typeface="Arial" pitchFamily="34" charset="0"/>
+              <a:cs typeface="Arial" pitchFamily="34" charset="0"/>
+            </a:endParaRPr>
           </a:p>
         </p:txBody>
       </p:sp>
+      <p:pic>
+        <p:nvPicPr>
+          <p:cNvPr id="4" name="Google Shape;1900;p87">
+            <a:extLst>
+              <a:ext uri="{FF2B5EF4-FFF2-40B4-BE49-F238E27FC236}">
+                <a16:creationId xmlns:a16="http://schemas.microsoft.com/office/drawing/2014/main" id="{D1BBE027-01DE-2A56-20AE-5C7A1746C429}"/>
+              </a:ext>
+            </a:extLst>
+          </p:cNvPr>
+          <p:cNvPicPr preferRelativeResize="0"/>
+          <p:nvPr/>
+        </p:nvPicPr>
+        <p:blipFill>
+          <a:blip r:embed="rId2">
+            <a:alphaModFix/>
+          </a:blip>
+          <a:stretch>
+            <a:fillRect/>
+          </a:stretch>
+        </p:blipFill>
+        <p:spPr>
+          <a:xfrm>
+            <a:off x="3302000" y="4724400"/>
+            <a:ext cx="7124700" cy="4238625"/>
+          </a:xfrm>
+          <a:prstGeom prst="rect">
+            <a:avLst/>
+          </a:prstGeom>
+          <a:noFill/>
+          <a:ln>
+            <a:noFill/>
+          </a:ln>
+        </p:spPr>
+      </p:pic>
       <p:sp>
         <p:nvSpPr>
-          <p:cNvPr id="126" name="На проекты запланирован месяц живого времени и 4 занятия, это занятие - первое.…"/>
+          <p:cNvPr id="5" name="Проект можно делать, а можно не делать. Например, доделывать в течение месяца домашние работы…">
+            <a:extLst>
+              <a:ext uri="{FF2B5EF4-FFF2-40B4-BE49-F238E27FC236}">
+                <a16:creationId xmlns:a16="http://schemas.microsoft.com/office/drawing/2014/main" id="{6817AAE3-69B1-DC7D-778C-C390532CD61E}"/>
+              </a:ext>
+            </a:extLst>
+          </p:cNvPr>
           <p:cNvSpPr txBox="1">
             <a:spLocks noGrp="1"/>
           </p:cNvSpPr>
@@ -4180,43 +3627,94 @@
           </p:nvPr>
         </p:nvSpPr>
         <p:spPr>
+          <a:xfrm>
+            <a:off x="2006600" y="2057400"/>
+            <a:ext cx="11099800" cy="1947949"/>
+          </a:xfrm>
           <a:prstGeom prst="rect">
             <a:avLst/>
           </a:prstGeom>
         </p:spPr>
         <p:txBody>
-          <a:bodyPr/>
+          <a:bodyPr>
+            <a:noAutofit/>
+          </a:bodyPr>
           <a:lstStyle/>
           <a:p>
-            <a:r>
-              <a:rPr>
-                <a:latin typeface="Arial" pitchFamily="34" charset="0"/>
-                <a:cs typeface="Arial" pitchFamily="34" charset="0"/>
+            <a:endParaRPr lang="ru-RU" sz="2400" b="0" i="0" dirty="0">
+              <a:solidFill>
+                <a:srgbClr val="222222"/>
+              </a:solidFill>
+              <a:effectLst/>
+              <a:latin typeface="Arial" panose="020B0604020202020204" pitchFamily="34" charset="0"/>
+            </a:endParaRPr>
+          </a:p>
+          <a:p>
+            <a:r>
+              <a:rPr lang="ru-RU" sz="2400" dirty="0">
+                <a:solidFill>
+                  <a:srgbClr val="222222"/>
+                </a:solidFill>
+                <a:latin typeface="Arial" panose="020B0604020202020204" pitchFamily="34" charset="0"/>
               </a:rPr>
-              <a:t>На проекты запланирован месяц живого времени и 4 занятия, это занятие - первое. </a:t>
-            </a:r>
-          </a:p>
-          <a:p>
-            <a:r>
-              <a:rPr>
-                <a:latin typeface="Arial" pitchFamily="34" charset="0"/>
-                <a:cs typeface="Arial" pitchFamily="34" charset="0"/>
+              <a:t>Индекс может занимать большой объем памяти;</a:t>
+            </a:r>
+          </a:p>
+          <a:p>
+            <a:r>
+              <a:rPr lang="ru-RU" sz="2400" dirty="0">
+                <a:solidFill>
+                  <a:srgbClr val="222222"/>
+                </a:solidFill>
+                <a:latin typeface="Arial" panose="020B0604020202020204" pitchFamily="34" charset="0"/>
               </a:rPr>
-              <a:t>Промежуточные занятия - это встречи по поводу проектов. Если есть необходимость: задать вопросы по проекту и удобнее решить их в таком формате</a:t>
-            </a:r>
-          </a:p>
-          <a:p>
-            <a:r>
-              <a:rPr>
-                <a:latin typeface="Arial" pitchFamily="34" charset="0"/>
-                <a:cs typeface="Arial" pitchFamily="34" charset="0"/>
+              <a:t>Чтение с диска занимает много времени</a:t>
+            </a:r>
+          </a:p>
+          <a:p>
+            <a:r>
+              <a:rPr lang="ru-RU" sz="2400" b="0" i="0" dirty="0">
+                <a:solidFill>
+                  <a:srgbClr val="222222"/>
+                </a:solidFill>
+                <a:effectLst/>
+                <a:latin typeface="Arial" panose="020B0604020202020204" pitchFamily="34" charset="0"/>
               </a:rPr>
-              <a:t>Также запланирована промежуточная встреча с презентацией результатов. Но это по желанию - можно и защитить в личном порядке (т.к. курс не про защиту проектов, в про алгоритмы) </a:t>
-            </a:r>
+              <a:t>Степень дерева зависит от размера блока диска;</a:t>
+            </a:r>
+          </a:p>
+          <a:p>
+            <a:r>
+              <a:rPr lang="ru-RU" sz="2400" dirty="0">
+                <a:solidFill>
+                  <a:srgbClr val="222222"/>
+                </a:solidFill>
+                <a:latin typeface="Arial" panose="020B0604020202020204" pitchFamily="34" charset="0"/>
+              </a:rPr>
+              <a:t>В узлах хранится указатели на записи таблиц</a:t>
+            </a:r>
+            <a:endParaRPr lang="ru-RU" sz="2400" b="0" i="0" dirty="0">
+              <a:solidFill>
+                <a:srgbClr val="222222"/>
+              </a:solidFill>
+              <a:effectLst/>
+              <a:latin typeface="Arial" panose="020B0604020202020204" pitchFamily="34" charset="0"/>
+            </a:endParaRPr>
+          </a:p>
+          <a:p>
+            <a:endParaRPr sz="2400" dirty="0">
+              <a:latin typeface="Arial" pitchFamily="34" charset="0"/>
+              <a:cs typeface="Arial" pitchFamily="34" charset="0"/>
+            </a:endParaRPr>
           </a:p>
         </p:txBody>
       </p:sp>
     </p:spTree>
+    <p:extLst>
+      <p:ext uri="{BB962C8B-B14F-4D97-AF65-F5344CB8AC3E}">
+        <p14:creationId xmlns:p14="http://schemas.microsoft.com/office/powerpoint/2010/main" val="3969923732"/>
+      </p:ext>
+    </p:extLst>
   </p:cSld>
   <p:clrMapOvr>
     <a:masterClrMapping/>
@@ -4244,7 +3742,7 @@
       </p:grpSpPr>
       <p:sp>
         <p:nvSpPr>
-          <p:cNvPr id="128" name="Темы проектов"/>
+          <p:cNvPr id="122" name="Базовая информация"/>
           <p:cNvSpPr txBox="1">
             <a:spLocks noGrp="1"/>
           </p:cNvSpPr>
@@ -4253,25 +3751,77 @@
           </p:nvPr>
         </p:nvSpPr>
         <p:spPr>
+          <a:xfrm>
+            <a:off x="952500" y="254000"/>
+            <a:ext cx="11099800" cy="1270000"/>
+          </a:xfrm>
           <a:prstGeom prst="rect">
             <a:avLst/>
           </a:prstGeom>
         </p:spPr>
         <p:txBody>
-          <a:bodyPr/>
+          <a:bodyPr>
+            <a:normAutofit fontScale="90000"/>
+          </a:bodyPr>
           <a:lstStyle/>
           <a:p>
             <a:r>
-              <a:rPr>
+              <a:rPr lang="ru-RU" dirty="0">
                 <a:latin typeface="Arial" pitchFamily="34" charset="0"/>
                 <a:cs typeface="Arial" pitchFamily="34" charset="0"/>
               </a:rPr>
-              <a:t>Темы проектов</a:t>
-            </a:r>
+              <a:t>Узел </a:t>
+            </a:r>
+            <a:r>
+              <a:rPr lang="en-US" dirty="0">
+                <a:latin typeface="Arial" pitchFamily="34" charset="0"/>
+                <a:cs typeface="Arial" pitchFamily="34" charset="0"/>
+              </a:rPr>
+              <a:t>B-Tree</a:t>
+            </a:r>
+            <a:endParaRPr dirty="0">
+              <a:latin typeface="Arial" pitchFamily="34" charset="0"/>
+              <a:cs typeface="Arial" pitchFamily="34" charset="0"/>
+            </a:endParaRPr>
           </a:p>
         </p:txBody>
       </p:sp>
+      <p:pic>
+        <p:nvPicPr>
+          <p:cNvPr id="8" name="Рисунок 7">
+            <a:extLst>
+              <a:ext uri="{FF2B5EF4-FFF2-40B4-BE49-F238E27FC236}">
+                <a16:creationId xmlns:a16="http://schemas.microsoft.com/office/drawing/2014/main" id="{DE335A9F-1028-A368-20C1-8964A3BDB651}"/>
+              </a:ext>
+            </a:extLst>
+          </p:cNvPr>
+          <p:cNvPicPr>
+            <a:picLocks noChangeAspect="1"/>
+          </p:cNvPicPr>
+          <p:nvPr/>
+        </p:nvPicPr>
+        <p:blipFill>
+          <a:blip r:embed="rId2"/>
+          <a:stretch>
+            <a:fillRect/>
+          </a:stretch>
+        </p:blipFill>
+        <p:spPr>
+          <a:xfrm>
+            <a:off x="3149600" y="1676400"/>
+            <a:ext cx="6172200" cy="6739368"/>
+          </a:xfrm>
+          <a:prstGeom prst="rect">
+            <a:avLst/>
+          </a:prstGeom>
+        </p:spPr>
+      </p:pic>
     </p:spTree>
+    <p:extLst>
+      <p:ext uri="{BB962C8B-B14F-4D97-AF65-F5344CB8AC3E}">
+        <p14:creationId xmlns:p14="http://schemas.microsoft.com/office/powerpoint/2010/main" val="2539318630"/>
+      </p:ext>
+    </p:extLst>
   </p:cSld>
   <p:clrMapOvr>
     <a:masterClrMapping/>
@@ -4299,7 +3849,7 @@
       </p:grpSpPr>
       <p:sp>
         <p:nvSpPr>
-          <p:cNvPr id="131" name="Михаил Горшков"/>
+          <p:cNvPr id="122" name="Базовая информация"/>
           <p:cNvSpPr txBox="1">
             <a:spLocks noGrp="1"/>
           </p:cNvSpPr>
@@ -4308,130 +3858,100 @@
           </p:nvPr>
         </p:nvSpPr>
         <p:spPr>
+          <a:xfrm>
+            <a:off x="952500" y="254000"/>
+            <a:ext cx="11099800" cy="1270000"/>
+          </a:xfrm>
           <a:prstGeom prst="rect">
             <a:avLst/>
           </a:prstGeom>
         </p:spPr>
         <p:txBody>
-          <a:bodyPr/>
+          <a:bodyPr>
+            <a:normAutofit fontScale="90000"/>
+          </a:bodyPr>
           <a:lstStyle/>
           <a:p>
             <a:r>
-              <a:rPr>
+              <a:rPr lang="en-US" dirty="0">
                 <a:latin typeface="Arial" pitchFamily="34" charset="0"/>
                 <a:cs typeface="Arial" pitchFamily="34" charset="0"/>
               </a:rPr>
-              <a:t>Михаил Горшков</a:t>
-            </a:r>
+              <a:t>B-Tree</a:t>
+            </a:r>
+            <a:endParaRPr dirty="0">
+              <a:latin typeface="Arial" pitchFamily="34" charset="0"/>
+              <a:cs typeface="Arial" pitchFamily="34" charset="0"/>
+            </a:endParaRPr>
           </a:p>
         </p:txBody>
       </p:sp>
-      <p:sp>
-        <p:nvSpPr>
-          <p:cNvPr id="132" name="Мини-поисковик по базе текстов…"/>
-          <p:cNvSpPr txBox="1">
-            <a:spLocks noGrp="1"/>
-          </p:cNvSpPr>
-          <p:nvPr>
-            <p:ph type="body" idx="1"/>
-          </p:nvPr>
-        </p:nvSpPr>
+      <p:pic>
+        <p:nvPicPr>
+          <p:cNvPr id="8" name="Рисунок 7">
+            <a:extLst>
+              <a:ext uri="{FF2B5EF4-FFF2-40B4-BE49-F238E27FC236}">
+                <a16:creationId xmlns:a16="http://schemas.microsoft.com/office/drawing/2014/main" id="{DE335A9F-1028-A368-20C1-8964A3BDB651}"/>
+              </a:ext>
+            </a:extLst>
+          </p:cNvPr>
+          <p:cNvPicPr>
+            <a:picLocks noChangeAspect="1"/>
+          </p:cNvPicPr>
+          <p:nvPr/>
+        </p:nvPicPr>
+        <p:blipFill>
+          <a:blip r:embed="rId2"/>
+          <a:stretch>
+            <a:fillRect/>
+          </a:stretch>
+        </p:blipFill>
         <p:spPr>
+          <a:xfrm>
+            <a:off x="3149600" y="1676400"/>
+            <a:ext cx="6172200" cy="6739368"/>
+          </a:xfrm>
           <a:prstGeom prst="rect">
             <a:avLst/>
           </a:prstGeom>
         </p:spPr>
-        <p:txBody>
-          <a:bodyPr/>
-          <a:lstStyle/>
-          <a:p>
-            <a:pPr marL="514350" indent="-514350" defTabSz="502412">
-              <a:spcBef>
-                <a:spcPts val="3600"/>
-              </a:spcBef>
-              <a:buFont typeface="+mj-lt"/>
-              <a:buAutoNum type="arabicPeriod"/>
-              <a:defRPr sz="2700"/>
-            </a:pPr>
-            <a:r>
-              <a:rPr>
-                <a:latin typeface="Arial" pitchFamily="34" charset="0"/>
-                <a:cs typeface="Arial" pitchFamily="34" charset="0"/>
-              </a:rPr>
-              <a:t>Мини-поисковик по базе текстов</a:t>
-            </a:r>
-          </a:p>
-          <a:p>
-            <a:pPr marL="514350" indent="-514350" defTabSz="502412">
-              <a:spcBef>
-                <a:spcPts val="3600"/>
-              </a:spcBef>
-              <a:buFont typeface="+mj-lt"/>
-              <a:buAutoNum type="arabicPeriod"/>
-              <a:defRPr sz="2700"/>
-            </a:pPr>
-            <a:r>
-              <a:rPr>
-                <a:latin typeface="Arial" pitchFamily="34" charset="0"/>
-                <a:cs typeface="Arial" pitchFamily="34" charset="0"/>
-              </a:rPr>
-              <a:t>Сервис саджестов. Работает по аналогии с поисковой строкой в Яндексе или Гугле</a:t>
-            </a:r>
-          </a:p>
-          <a:p>
-            <a:pPr marL="514350" indent="-514350" defTabSz="502412">
-              <a:spcBef>
-                <a:spcPts val="3600"/>
-              </a:spcBef>
-              <a:buFont typeface="+mj-lt"/>
-              <a:buAutoNum type="arabicPeriod"/>
-              <a:defRPr sz="2700"/>
-            </a:pPr>
-            <a:r>
-              <a:rPr>
-                <a:latin typeface="Arial" pitchFamily="34" charset="0"/>
-                <a:cs typeface="Arial" pitchFamily="34" charset="0"/>
-              </a:rPr>
-              <a:t>Кастомная хэш-таблица</a:t>
-            </a:r>
-          </a:p>
-          <a:p>
-            <a:pPr marL="514350" indent="-514350" defTabSz="502412">
-              <a:spcBef>
-                <a:spcPts val="3600"/>
-              </a:spcBef>
-              <a:buFont typeface="+mj-lt"/>
-              <a:buAutoNum type="arabicPeriod"/>
-              <a:defRPr sz="2700"/>
-            </a:pPr>
-            <a:r>
-              <a:rPr>
-                <a:latin typeface="Arial" pitchFamily="34" charset="0"/>
-                <a:cs typeface="Arial" pitchFamily="34" charset="0"/>
-              </a:rPr>
-              <a:t>Менеджер памяти и garbage collector</a:t>
-            </a:r>
-          </a:p>
-          <a:p>
-            <a:pPr marL="514350" indent="-514350" defTabSz="502412">
-              <a:spcBef>
-                <a:spcPts val="3600"/>
-              </a:spcBef>
-              <a:buFont typeface="+mj-lt"/>
-              <a:buAutoNum type="arabicPeriod"/>
-              <a:defRPr sz="2700"/>
-            </a:pPr>
-            <a:r>
-              <a:rPr>
-                <a:latin typeface="Arial" pitchFamily="34" charset="0"/>
-                <a:cs typeface="Arial" pitchFamily="34" charset="0"/>
-              </a:rPr>
-              <a:t>Индексы для СУБД. Можно реализовать один из индексов: B-Tree, LSM</a:t>
-            </a:r>
-          </a:p>
-        </p:txBody>
-      </p:sp>
+      </p:pic>
+      <p:pic>
+        <p:nvPicPr>
+          <p:cNvPr id="3" name="Рисунок 2">
+            <a:extLst>
+              <a:ext uri="{FF2B5EF4-FFF2-40B4-BE49-F238E27FC236}">
+                <a16:creationId xmlns:a16="http://schemas.microsoft.com/office/drawing/2014/main" id="{821D3C15-FA2D-92EA-7A22-66340EBA2063}"/>
+              </a:ext>
+            </a:extLst>
+          </p:cNvPr>
+          <p:cNvPicPr>
+            <a:picLocks noChangeAspect="1"/>
+          </p:cNvPicPr>
+          <p:nvPr/>
+        </p:nvPicPr>
+        <p:blipFill>
+          <a:blip r:embed="rId3"/>
+          <a:stretch>
+            <a:fillRect/>
+          </a:stretch>
+        </p:blipFill>
+        <p:spPr>
+          <a:xfrm>
+            <a:off x="3149132" y="1385400"/>
+            <a:ext cx="6706536" cy="6982799"/>
+          </a:xfrm>
+          <a:prstGeom prst="rect">
+            <a:avLst/>
+          </a:prstGeom>
+        </p:spPr>
+      </p:pic>
     </p:spTree>
+    <p:extLst>
+      <p:ext uri="{BB962C8B-B14F-4D97-AF65-F5344CB8AC3E}">
+        <p14:creationId xmlns:p14="http://schemas.microsoft.com/office/powerpoint/2010/main" val="2818977223"/>
+      </p:ext>
+    </p:extLst>
   </p:cSld>
   <p:clrMapOvr>
     <a:masterClrMapping/>
@@ -4459,7 +3979,7 @@
       </p:grpSpPr>
       <p:sp>
         <p:nvSpPr>
-          <p:cNvPr id="137" name="Мини-поисковик по базе текстов"/>
+          <p:cNvPr id="122" name="Базовая информация"/>
           <p:cNvSpPr txBox="1">
             <a:spLocks noGrp="1"/>
           </p:cNvSpPr>
@@ -4468,109 +3988,70 @@
           </p:nvPr>
         </p:nvSpPr>
         <p:spPr>
+          <a:xfrm>
+            <a:off x="952500" y="254000"/>
+            <a:ext cx="11099800" cy="1270000"/>
+          </a:xfrm>
           <a:prstGeom prst="rect">
             <a:avLst/>
           </a:prstGeom>
         </p:spPr>
         <p:txBody>
-          <a:bodyPr/>
-          <a:lstStyle>
-            <a:lvl1pPr defTabSz="484886">
-              <a:defRPr sz="6600"/>
-            </a:lvl1pPr>
-          </a:lstStyle>
-          <a:p>
-            <a:r>
-              <a:rPr>
+          <a:bodyPr>
+            <a:normAutofit fontScale="90000"/>
+          </a:bodyPr>
+          <a:lstStyle/>
+          <a:p>
+            <a:r>
+              <a:rPr lang="ru-RU" dirty="0">
                 <a:latin typeface="Arial" pitchFamily="34" charset="0"/>
                 <a:cs typeface="Arial" pitchFamily="34" charset="0"/>
               </a:rPr>
-              <a:t>Мини-поисковик по базе текстов</a:t>
-            </a:r>
+              <a:t>Запись узла</a:t>
+            </a:r>
+            <a:endParaRPr dirty="0">
+              <a:latin typeface="Arial" pitchFamily="34" charset="0"/>
+              <a:cs typeface="Arial" pitchFamily="34" charset="0"/>
+            </a:endParaRPr>
           </a:p>
         </p:txBody>
       </p:sp>
-      <p:sp>
-        <p:nvSpPr>
-          <p:cNvPr id="138" name="Софт (индексатор) индексирует файлы и создает индекс для последующего использования поисковой частью. При изменении текста (текстов) необходимо переиндексировать корпус.…"/>
-          <p:cNvSpPr txBox="1">
-            <a:spLocks noGrp="1"/>
-          </p:cNvSpPr>
-          <p:nvPr>
-            <p:ph type="body" idx="1"/>
-          </p:nvPr>
-        </p:nvSpPr>
+      <p:pic>
+        <p:nvPicPr>
+          <p:cNvPr id="4" name="Рисунок 3">
+            <a:extLst>
+              <a:ext uri="{FF2B5EF4-FFF2-40B4-BE49-F238E27FC236}">
+                <a16:creationId xmlns:a16="http://schemas.microsoft.com/office/drawing/2014/main" id="{EE500109-0D11-A033-EEA1-3BF0E4CE8C7A}"/>
+              </a:ext>
+            </a:extLst>
+          </p:cNvPr>
+          <p:cNvPicPr>
+            <a:picLocks noChangeAspect="1"/>
+          </p:cNvPicPr>
+          <p:nvPr/>
+        </p:nvPicPr>
+        <p:blipFill>
+          <a:blip r:embed="rId2"/>
+          <a:stretch>
+            <a:fillRect/>
+          </a:stretch>
+        </p:blipFill>
         <p:spPr>
+          <a:xfrm>
+            <a:off x="2882900" y="1861716"/>
+            <a:ext cx="7239000" cy="6030167"/>
+          </a:xfrm>
           <a:prstGeom prst="rect">
             <a:avLst/>
           </a:prstGeom>
         </p:spPr>
-        <p:txBody>
-          <a:bodyPr/>
-          <a:lstStyle/>
-          <a:p>
-            <a:pPr marL="386715" indent="-386715" defTabSz="508254">
-              <a:spcBef>
-                <a:spcPts val="3600"/>
-              </a:spcBef>
-              <a:defRPr sz="2700"/>
-            </a:pPr>
-            <a:r>
-              <a:rPr>
-                <a:latin typeface="Arial" pitchFamily="34" charset="0"/>
-                <a:cs typeface="Arial" pitchFamily="34" charset="0"/>
-              </a:rPr>
-              <a:t>Софт (индексатор) индексирует файлы и создает индекс для последующего использования поисковой частью. При изменении текста (текстов) необходимо переиндексировать корпус.</a:t>
-            </a:r>
-          </a:p>
-          <a:p>
-            <a:pPr marL="386715" indent="-386715" defTabSz="508254">
-              <a:spcBef>
-                <a:spcPts val="3600"/>
-              </a:spcBef>
-              <a:defRPr sz="2700"/>
-            </a:pPr>
-            <a:r>
-              <a:rPr>
-                <a:latin typeface="Arial" pitchFamily="34" charset="0"/>
-                <a:cs typeface="Arial" pitchFamily="34" charset="0"/>
-              </a:rPr>
-              <a:t>Поисковик принимает на вход слово (фразу) и выдает тексты, в которых слово (фраза) встречаются. Опционально сделать поддержку словоформ. Вводишь “собака“, поисковик выводит все тексты со словом “собака“, “собаки“, “Собакевич” и т.д.</a:t>
-            </a:r>
-          </a:p>
-          <a:p>
-            <a:pPr marL="386715" indent="-386715" defTabSz="508254">
-              <a:spcBef>
-                <a:spcPts val="3600"/>
-              </a:spcBef>
-              <a:defRPr sz="2700"/>
-            </a:pPr>
-            <a:r>
-              <a:rPr>
-                <a:latin typeface="Arial" pitchFamily="34" charset="0"/>
-                <a:cs typeface="Arial" pitchFamily="34" charset="0"/>
-              </a:rPr>
-              <a:t>Техническую реализацию можно забрейнстормить прямо на вебинаре.</a:t>
-            </a:r>
-          </a:p>
-          <a:p>
-            <a:pPr marL="386715" indent="-386715" defTabSz="508254">
-              <a:spcBef>
-                <a:spcPts val="3600"/>
-              </a:spcBef>
-              <a:defRPr sz="2700"/>
-            </a:pPr>
-            <a:r>
-              <a:rPr>
-                <a:latin typeface="Arial" pitchFamily="34" charset="0"/>
-                <a:cs typeface="Arial" pitchFamily="34" charset="0"/>
-              </a:rPr>
-              <a:t>Можно ранжирование</a:t>
-            </a:r>
-          </a:p>
-        </p:txBody>
-      </p:sp>
+      </p:pic>
     </p:spTree>
+    <p:extLst>
+      <p:ext uri="{BB962C8B-B14F-4D97-AF65-F5344CB8AC3E}">
+        <p14:creationId xmlns:p14="http://schemas.microsoft.com/office/powerpoint/2010/main" val="614118111"/>
+      </p:ext>
+    </p:extLst>
   </p:cSld>
   <p:clrMapOvr>
     <a:masterClrMapping/>
@@ -4598,7 +4079,7 @@
       </p:grpSpPr>
       <p:sp>
         <p:nvSpPr>
-          <p:cNvPr id="140" name="Сервис саджестов"/>
+          <p:cNvPr id="122" name="Базовая информация"/>
           <p:cNvSpPr txBox="1">
             <a:spLocks noGrp="1"/>
           </p:cNvSpPr>
@@ -4607,63 +4088,70 @@
           </p:nvPr>
         </p:nvSpPr>
         <p:spPr>
+          <a:xfrm>
+            <a:off x="952500" y="254000"/>
+            <a:ext cx="11099800" cy="1270000"/>
+          </a:xfrm>
           <a:prstGeom prst="rect">
             <a:avLst/>
           </a:prstGeom>
         </p:spPr>
         <p:txBody>
-          <a:bodyPr/>
+          <a:bodyPr>
+            <a:normAutofit fontScale="90000"/>
+          </a:bodyPr>
           <a:lstStyle/>
           <a:p>
             <a:r>
-              <a:rPr>
+              <a:rPr lang="ru-RU" dirty="0">
                 <a:latin typeface="Arial" pitchFamily="34" charset="0"/>
                 <a:cs typeface="Arial" pitchFamily="34" charset="0"/>
               </a:rPr>
-              <a:t>Сервис саджестов</a:t>
-            </a:r>
+              <a:t>Запись узла</a:t>
+            </a:r>
+            <a:endParaRPr dirty="0">
+              <a:latin typeface="Arial" pitchFamily="34" charset="0"/>
+              <a:cs typeface="Arial" pitchFamily="34" charset="0"/>
+            </a:endParaRPr>
           </a:p>
         </p:txBody>
       </p:sp>
-      <p:sp>
-        <p:nvSpPr>
-          <p:cNvPr id="141" name="Работает по аналогии с поисковой строкой в Яндексе или Гугле. Задается список текстов. Они индексируются. Пишется софт, который по началу слова-фразы-предложения выдает все возможные продолжения, содержащиеся в этих текстах…"/>
-          <p:cNvSpPr txBox="1">
-            <a:spLocks noGrp="1"/>
-          </p:cNvSpPr>
-          <p:nvPr>
-            <p:ph type="body" idx="1"/>
-          </p:nvPr>
-        </p:nvSpPr>
+      <p:pic>
+        <p:nvPicPr>
+          <p:cNvPr id="3" name="Рисунок 2">
+            <a:extLst>
+              <a:ext uri="{FF2B5EF4-FFF2-40B4-BE49-F238E27FC236}">
+                <a16:creationId xmlns:a16="http://schemas.microsoft.com/office/drawing/2014/main" id="{65916024-9839-2404-74FA-02DAB6ABF1A6}"/>
+              </a:ext>
+            </a:extLst>
+          </p:cNvPr>
+          <p:cNvPicPr>
+            <a:picLocks noChangeAspect="1"/>
+          </p:cNvPicPr>
+          <p:nvPr/>
+        </p:nvPicPr>
+        <p:blipFill>
+          <a:blip r:embed="rId2"/>
+          <a:stretch>
+            <a:fillRect/>
+          </a:stretch>
+        </p:blipFill>
         <p:spPr>
+          <a:xfrm>
+            <a:off x="3468264" y="1447800"/>
+            <a:ext cx="6068272" cy="8030696"/>
+          </a:xfrm>
           <a:prstGeom prst="rect">
             <a:avLst/>
           </a:prstGeom>
         </p:spPr>
-        <p:txBody>
-          <a:bodyPr/>
-          <a:lstStyle/>
-          <a:p>
-            <a:r>
-              <a:rPr>
-                <a:latin typeface="Arial" pitchFamily="34" charset="0"/>
-                <a:cs typeface="Arial" pitchFamily="34" charset="0"/>
-              </a:rPr>
-              <a:t>Работает по аналогии с поисковой строкой в Яндексе или Гугле. Задается список текстов. Они индексируются. Пишется софт, который по началу слова-фразы-предложения выдает все возможные продолжения, содержащиеся в этих текстах</a:t>
-            </a:r>
-          </a:p>
-          <a:p>
-            <a:r>
-              <a:rPr>
-                <a:latin typeface="Arial" pitchFamily="34" charset="0"/>
-                <a:cs typeface="Arial" pitchFamily="34" charset="0"/>
-              </a:rPr>
-              <a:t>Можно усложнять, добавляя ранжирование</a:t>
-            </a:r>
-          </a:p>
-        </p:txBody>
-      </p:sp>
+      </p:pic>
     </p:spTree>
+    <p:extLst>
+      <p:ext uri="{BB962C8B-B14F-4D97-AF65-F5344CB8AC3E}">
+        <p14:creationId xmlns:p14="http://schemas.microsoft.com/office/powerpoint/2010/main" val="3330495188"/>
+      </p:ext>
+    </p:extLst>
   </p:cSld>
   <p:clrMapOvr>
     <a:masterClrMapping/>
@@ -4691,7 +4179,7 @@
       </p:grpSpPr>
       <p:sp>
         <p:nvSpPr>
-          <p:cNvPr id="143" name="Кастомная хеш-таблица"/>
+          <p:cNvPr id="122" name="Базовая информация"/>
           <p:cNvSpPr txBox="1">
             <a:spLocks noGrp="1"/>
           </p:cNvSpPr>
@@ -4700,65 +4188,70 @@
           </p:nvPr>
         </p:nvSpPr>
         <p:spPr>
+          <a:xfrm>
+            <a:off x="952500" y="254000"/>
+            <a:ext cx="11099800" cy="1270000"/>
+          </a:xfrm>
           <a:prstGeom prst="rect">
             <a:avLst/>
           </a:prstGeom>
         </p:spPr>
         <p:txBody>
-          <a:bodyPr/>
-          <a:lstStyle>
-            <a:lvl1pPr defTabSz="525779">
-              <a:defRPr sz="7200"/>
-            </a:lvl1pPr>
-          </a:lstStyle>
-          <a:p>
-            <a:r>
-              <a:rPr>
+          <a:bodyPr>
+            <a:normAutofit fontScale="90000"/>
+          </a:bodyPr>
+          <a:lstStyle/>
+          <a:p>
+            <a:r>
+              <a:rPr lang="ru-RU" dirty="0">
                 <a:latin typeface="Arial" pitchFamily="34" charset="0"/>
                 <a:cs typeface="Arial" pitchFamily="34" charset="0"/>
               </a:rPr>
-              <a:t>Кастомная хеш-таблица </a:t>
-            </a:r>
+              <a:t>Чтение узла</a:t>
+            </a:r>
+            <a:endParaRPr dirty="0">
+              <a:latin typeface="Arial" pitchFamily="34" charset="0"/>
+              <a:cs typeface="Arial" pitchFamily="34" charset="0"/>
+            </a:endParaRPr>
           </a:p>
         </p:txBody>
       </p:sp>
-      <p:sp>
-        <p:nvSpPr>
-          <p:cNvPr id="144" name="более-менее экзотический алгоритм хэширования, например, реализовать Cuckoo Hashing и сравнить его работу, скажем, со стандартной реализацией хэш-таблиц в вашем ЯП.…"/>
-          <p:cNvSpPr txBox="1">
-            <a:spLocks noGrp="1"/>
-          </p:cNvSpPr>
-          <p:nvPr>
-            <p:ph type="body" idx="1"/>
-          </p:nvPr>
-        </p:nvSpPr>
+      <p:pic>
+        <p:nvPicPr>
+          <p:cNvPr id="3" name="Рисунок 2">
+            <a:extLst>
+              <a:ext uri="{FF2B5EF4-FFF2-40B4-BE49-F238E27FC236}">
+                <a16:creationId xmlns:a16="http://schemas.microsoft.com/office/drawing/2014/main" id="{65916024-9839-2404-74FA-02DAB6ABF1A6}"/>
+              </a:ext>
+            </a:extLst>
+          </p:cNvPr>
+          <p:cNvPicPr>
+            <a:picLocks noChangeAspect="1"/>
+          </p:cNvPicPr>
+          <p:nvPr/>
+        </p:nvPicPr>
+        <p:blipFill>
+          <a:blip r:embed="rId2"/>
+          <a:stretch>
+            <a:fillRect/>
+          </a:stretch>
+        </p:blipFill>
         <p:spPr>
+          <a:xfrm>
+            <a:off x="3468264" y="1447800"/>
+            <a:ext cx="6068272" cy="8030696"/>
+          </a:xfrm>
           <a:prstGeom prst="rect">
             <a:avLst/>
           </a:prstGeom>
         </p:spPr>
-        <p:txBody>
-          <a:bodyPr/>
-          <a:lstStyle/>
-          <a:p>
-            <a:r>
-              <a:rPr>
-                <a:latin typeface="+mj-lt"/>
-              </a:rPr>
-              <a:t>более-менее экзотический алгоритм хэширования, например, реализовать Cuckoo Hashing и сравнить его работу, скажем, со стандартной реализацией хэш-таблиц в вашем ЯП.</a:t>
-            </a:r>
-          </a:p>
-          <a:p>
-            <a:r>
-              <a:rPr>
-                <a:latin typeface="+mj-lt"/>
-              </a:rPr>
-              <a:t>Также можно взять любой другой не очень распространенный алгоритм (robin hood, … и т.д)</a:t>
-            </a:r>
-          </a:p>
-        </p:txBody>
-      </p:sp>
+      </p:pic>
     </p:spTree>
+    <p:extLst>
+      <p:ext uri="{BB962C8B-B14F-4D97-AF65-F5344CB8AC3E}">
+        <p14:creationId xmlns:p14="http://schemas.microsoft.com/office/powerpoint/2010/main" val="2212536990"/>
+      </p:ext>
+    </p:extLst>
   </p:cSld>
   <p:clrMapOvr>
     <a:masterClrMapping/>
@@ -4786,7 +4279,7 @@
       </p:grpSpPr>
       <p:sp>
         <p:nvSpPr>
-          <p:cNvPr id="146" name="Менеджер памяти"/>
+          <p:cNvPr id="122" name="Базовая информация"/>
           <p:cNvSpPr txBox="1">
             <a:spLocks noGrp="1"/>
           </p:cNvSpPr>
@@ -4795,27 +4288,43 @@
           </p:nvPr>
         </p:nvSpPr>
         <p:spPr>
+          <a:xfrm>
+            <a:off x="952500" y="254000"/>
+            <a:ext cx="11099800" cy="1270000"/>
+          </a:xfrm>
           <a:prstGeom prst="rect">
             <a:avLst/>
           </a:prstGeom>
         </p:spPr>
         <p:txBody>
-          <a:bodyPr/>
+          <a:bodyPr>
+            <a:normAutofit fontScale="90000"/>
+          </a:bodyPr>
           <a:lstStyle/>
           <a:p>
             <a:r>
-              <a:rPr>
+              <a:rPr lang="ru-RU" dirty="0">
                 <a:latin typeface="Arial" pitchFamily="34" charset="0"/>
                 <a:cs typeface="Arial" pitchFamily="34" charset="0"/>
               </a:rPr>
-              <a:t>Менеджер памяти</a:t>
-            </a:r>
+              <a:t>Команды</a:t>
+            </a:r>
+            <a:endParaRPr dirty="0">
+              <a:latin typeface="Arial" pitchFamily="34" charset="0"/>
+              <a:cs typeface="Arial" pitchFamily="34" charset="0"/>
+            </a:endParaRPr>
           </a:p>
         </p:txBody>
       </p:sp>
       <p:sp>
         <p:nvSpPr>
-          <p:cNvPr id="147" name="Менеджер памяти и garbage collector…"/>
+          <p:cNvPr id="4" name="Проект можно делать, а можно не делать. Например, доделывать в течение месяца домашние работы…">
+            <a:extLst>
+              <a:ext uri="{FF2B5EF4-FFF2-40B4-BE49-F238E27FC236}">
+                <a16:creationId xmlns:a16="http://schemas.microsoft.com/office/drawing/2014/main" id="{1F403D45-83A3-D37B-6960-4B3CF5B966B6}"/>
+              </a:ext>
+            </a:extLst>
+          </p:cNvPr>
           <p:cNvSpPr txBox="1">
             <a:spLocks noGrp="1"/>
           </p:cNvSpPr>
@@ -4824,40 +4333,133 @@
           </p:nvPr>
         </p:nvSpPr>
         <p:spPr>
+          <a:xfrm>
+            <a:off x="2006600" y="2819400"/>
+            <a:ext cx="11099800" cy="1947949"/>
+          </a:xfrm>
           <a:prstGeom prst="rect">
             <a:avLst/>
           </a:prstGeom>
         </p:spPr>
         <p:txBody>
-          <a:bodyPr/>
+          <a:bodyPr>
+            <a:noAutofit/>
+          </a:bodyPr>
           <a:lstStyle/>
           <a:p>
-            <a:r>
-              <a:rPr>
-                <a:latin typeface="+mj-lt"/>
+            <a:endParaRPr lang="ru-RU" sz="2400" b="0" i="0" dirty="0">
+              <a:solidFill>
+                <a:srgbClr val="222222"/>
+              </a:solidFill>
+              <a:effectLst/>
+              <a:latin typeface="Arial" panose="020B0604020202020204" pitchFamily="34" charset="0"/>
+            </a:endParaRPr>
+          </a:p>
+          <a:p>
+            <a:r>
+              <a:rPr lang="ru-RU" sz="2400" dirty="0">
+                <a:solidFill>
+                  <a:srgbClr val="222222"/>
+                </a:solidFill>
+                <a:latin typeface="Arial" panose="020B0604020202020204" pitchFamily="34" charset="0"/>
               </a:rPr>
-              <a:t>Менеджер памяти и garbage collector</a:t>
-            </a:r>
-          </a:p>
-          <a:p>
-            <a:r>
-              <a:rPr>
-                <a:latin typeface="+mj-lt"/>
+              <a:t>Выборка данных:</a:t>
+            </a:r>
+          </a:p>
+          <a:p>
+            <a:pPr marL="0" indent="0">
+              <a:buNone/>
+            </a:pPr>
+            <a:r>
+              <a:rPr lang="en-US" sz="2400" dirty="0">
+                <a:solidFill>
+                  <a:srgbClr val="222222"/>
+                </a:solidFill>
+                <a:latin typeface="Arial" panose="020B0604020202020204" pitchFamily="34" charset="0"/>
               </a:rPr>
-              <a:t>Менеджер памяти применяется для узкоспециализированный целей, скажем, в C++</a:t>
-            </a:r>
-          </a:p>
-          <a:p>
-            <a:r>
-              <a:rPr>
-                <a:latin typeface="+mj-lt"/>
+              <a:t>select * from Cars where ID = 5</a:t>
+            </a:r>
+            <a:endParaRPr lang="ru-RU" sz="2400" dirty="0">
+              <a:solidFill>
+                <a:srgbClr val="222222"/>
+              </a:solidFill>
+              <a:latin typeface="Arial" panose="020B0604020202020204" pitchFamily="34" charset="0"/>
+            </a:endParaRPr>
+          </a:p>
+          <a:p>
+            <a:r>
+              <a:rPr lang="ru-RU" sz="2400" dirty="0">
+                <a:solidFill>
+                  <a:srgbClr val="222222"/>
+                </a:solidFill>
+                <a:latin typeface="Arial" panose="020B0604020202020204" pitchFamily="34" charset="0"/>
               </a:rPr>
-              <a:t> Можно реализовать менеджер памяти, построенный на базе одного из алгоритмов, рассмотренных на вебинаре по менеджменту памяти.</a:t>
-            </a:r>
+              <a:t>Создание индекса</a:t>
+            </a:r>
+          </a:p>
+          <a:p>
+            <a:pPr marL="0" indent="0">
+              <a:buNone/>
+            </a:pPr>
+            <a:r>
+              <a:rPr lang="en-US" sz="2400" dirty="0">
+                <a:solidFill>
+                  <a:srgbClr val="222222"/>
+                </a:solidFill>
+                <a:latin typeface="Arial" panose="020B0604020202020204" pitchFamily="34" charset="0"/>
+              </a:rPr>
+              <a:t>CREATE INDEX PK_INDEX ON Cars (ID)</a:t>
+            </a:r>
+            <a:endParaRPr lang="ru-RU" sz="2400" dirty="0">
+              <a:solidFill>
+                <a:srgbClr val="222222"/>
+              </a:solidFill>
+              <a:latin typeface="Arial" panose="020B0604020202020204" pitchFamily="34" charset="0"/>
+            </a:endParaRPr>
+          </a:p>
+          <a:p>
+            <a:r>
+              <a:rPr lang="ru-RU" sz="2400" b="0" i="0" dirty="0">
+                <a:solidFill>
+                  <a:srgbClr val="222222"/>
+                </a:solidFill>
+                <a:effectLst/>
+                <a:latin typeface="Arial" panose="020B0604020202020204" pitchFamily="34" charset="0"/>
+              </a:rPr>
+              <a:t>Вставка данных:</a:t>
+            </a:r>
+          </a:p>
+          <a:p>
+            <a:pPr marL="0" indent="0">
+              <a:buNone/>
+            </a:pPr>
+            <a:r>
+              <a:rPr lang="en-US" sz="2400" dirty="0">
+                <a:latin typeface="Arial" pitchFamily="34" charset="0"/>
+                <a:cs typeface="Arial" pitchFamily="34" charset="0"/>
+              </a:rPr>
+              <a:t>insert into cars values (5UXTA6C04N,Thurston,Olympia</a:t>
+            </a:r>
+            <a:r>
+              <a:rPr lang="ru-RU" sz="2400" dirty="0">
+                <a:latin typeface="Arial" pitchFamily="34" charset="0"/>
+                <a:cs typeface="Arial" pitchFamily="34" charset="0"/>
+              </a:rPr>
+              <a:t>…</a:t>
+            </a:r>
+            <a:endParaRPr sz="2400" dirty="0">
+              <a:latin typeface="Arial" pitchFamily="34" charset="0"/>
+              <a:cs typeface="Arial" pitchFamily="34" charset="0"/>
+            </a:endParaRPr>
           </a:p>
         </p:txBody>
       </p:sp>
     </p:spTree>
+    <p:extLst>
+      <p:ext uri="{BB962C8B-B14F-4D97-AF65-F5344CB8AC3E}">
+        <p14:creationId xmlns:p14="http://schemas.microsoft.com/office/powerpoint/2010/main" val="2997481127"/>
+      </p:ext>
+    </p:extLst>
   </p:cSld>
   <p:clrMapOvr>
     <a:masterClrMapping/>

</xml_diff>

<commit_message>
chore: Project PResentatioon final version
</commit_message>
<xml_diff>
--- a/Проекттная работа BTree индексы.pptx
+++ b/Проекттная работа BTree индексы.pptx
@@ -5,7 +5,7 @@
     <p:sldMasterId id="2147483648" r:id="rId1"/>
   </p:sldMasterIdLst>
   <p:notesMasterIdLst>
-    <p:notesMasterId r:id="rId11"/>
+    <p:notesMasterId r:id="rId12"/>
   </p:notesMasterIdLst>
   <p:sldIdLst>
     <p:sldId id="256" r:id="rId2"/>
@@ -16,7 +16,8 @@
     <p:sldId id="261" r:id="rId7"/>
     <p:sldId id="262" r:id="rId8"/>
     <p:sldId id="263" r:id="rId9"/>
-    <p:sldId id="264" r:id="rId10"/>
+    <p:sldId id="265" r:id="rId10"/>
+    <p:sldId id="264" r:id="rId11"/>
   </p:sldIdLst>
   <p:sldSz cx="13004800" cy="9753600"/>
   <p:notesSz cx="6858000" cy="9144000"/>
@@ -3304,6 +3305,214 @@
 </p:sld>
 </file>
 
+<file path=ppt/slides/slide10.xml><?xml version="1.0" encoding="utf-8"?>
+<p:sld xmlns:a="http://schemas.openxmlformats.org/drawingml/2006/main" xmlns:r="http://schemas.openxmlformats.org/officeDocument/2006/relationships" xmlns:p="http://schemas.openxmlformats.org/presentationml/2006/main">
+  <p:cSld>
+    <p:spTree>
+      <p:nvGrpSpPr>
+        <p:cNvPr id="1" name=""/>
+        <p:cNvGrpSpPr/>
+        <p:nvPr/>
+      </p:nvGrpSpPr>
+      <p:grpSpPr>
+        <a:xfrm>
+          <a:off x="0" y="0"/>
+          <a:ext cx="0" cy="0"/>
+          <a:chOff x="0" y="0"/>
+          <a:chExt cx="0" cy="0"/>
+        </a:xfrm>
+      </p:grpSpPr>
+      <p:sp>
+        <p:nvSpPr>
+          <p:cNvPr id="122" name="Базовая информация"/>
+          <p:cNvSpPr txBox="1">
+            <a:spLocks noGrp="1"/>
+          </p:cNvSpPr>
+          <p:nvPr>
+            <p:ph type="title"/>
+          </p:nvPr>
+        </p:nvSpPr>
+        <p:spPr>
+          <a:xfrm>
+            <a:off x="952500" y="254000"/>
+            <a:ext cx="11099800" cy="1270000"/>
+          </a:xfrm>
+          <a:prstGeom prst="rect">
+            <a:avLst/>
+          </a:prstGeom>
+        </p:spPr>
+        <p:txBody>
+          <a:bodyPr>
+            <a:normAutofit fontScale="90000"/>
+          </a:bodyPr>
+          <a:lstStyle/>
+          <a:p>
+            <a:r>
+              <a:rPr lang="ru-RU" dirty="0">
+                <a:latin typeface="Arial" pitchFamily="34" charset="0"/>
+                <a:cs typeface="Arial" pitchFamily="34" charset="0"/>
+              </a:rPr>
+              <a:t>Команды</a:t>
+            </a:r>
+            <a:endParaRPr dirty="0">
+              <a:latin typeface="Arial" pitchFamily="34" charset="0"/>
+              <a:cs typeface="Arial" pitchFamily="34" charset="0"/>
+            </a:endParaRPr>
+          </a:p>
+        </p:txBody>
+      </p:sp>
+      <p:sp>
+        <p:nvSpPr>
+          <p:cNvPr id="4" name="Проект можно делать, а можно не делать. Например, доделывать в течение месяца домашние работы…">
+            <a:extLst>
+              <a:ext uri="{FF2B5EF4-FFF2-40B4-BE49-F238E27FC236}">
+                <a16:creationId xmlns:a16="http://schemas.microsoft.com/office/drawing/2014/main" id="{1F403D45-83A3-D37B-6960-4B3CF5B966B6}"/>
+              </a:ext>
+            </a:extLst>
+          </p:cNvPr>
+          <p:cNvSpPr txBox="1">
+            <a:spLocks noGrp="1"/>
+          </p:cNvSpPr>
+          <p:nvPr>
+            <p:ph type="body" idx="1"/>
+          </p:nvPr>
+        </p:nvSpPr>
+        <p:spPr>
+          <a:xfrm>
+            <a:off x="2006600" y="2819400"/>
+            <a:ext cx="11099800" cy="1947949"/>
+          </a:xfrm>
+          <a:prstGeom prst="rect">
+            <a:avLst/>
+          </a:prstGeom>
+        </p:spPr>
+        <p:txBody>
+          <a:bodyPr>
+            <a:noAutofit/>
+          </a:bodyPr>
+          <a:lstStyle/>
+          <a:p>
+            <a:endParaRPr lang="ru-RU" sz="2400" b="0" i="0" dirty="0">
+              <a:solidFill>
+                <a:srgbClr val="222222"/>
+              </a:solidFill>
+              <a:effectLst/>
+              <a:latin typeface="Arial" panose="020B0604020202020204" pitchFamily="34" charset="0"/>
+            </a:endParaRPr>
+          </a:p>
+          <a:p>
+            <a:r>
+              <a:rPr lang="ru-RU" sz="2400" dirty="0">
+                <a:solidFill>
+                  <a:srgbClr val="222222"/>
+                </a:solidFill>
+                <a:latin typeface="Arial" panose="020B0604020202020204" pitchFamily="34" charset="0"/>
+              </a:rPr>
+              <a:t>Выборка данных:</a:t>
+            </a:r>
+          </a:p>
+          <a:p>
+            <a:pPr marL="0" indent="0">
+              <a:buNone/>
+            </a:pPr>
+            <a:r>
+              <a:rPr lang="en-US" sz="2400" dirty="0">
+                <a:solidFill>
+                  <a:srgbClr val="222222"/>
+                </a:solidFill>
+                <a:latin typeface="Arial" panose="020B0604020202020204" pitchFamily="34" charset="0"/>
+              </a:rPr>
+              <a:t>select * from Cars where ID = 5</a:t>
+            </a:r>
+            <a:endParaRPr lang="ru-RU" sz="2400" dirty="0">
+              <a:solidFill>
+                <a:srgbClr val="222222"/>
+              </a:solidFill>
+              <a:latin typeface="Arial" panose="020B0604020202020204" pitchFamily="34" charset="0"/>
+            </a:endParaRPr>
+          </a:p>
+          <a:p>
+            <a:r>
+              <a:rPr lang="ru-RU" sz="2400" dirty="0">
+                <a:solidFill>
+                  <a:srgbClr val="222222"/>
+                </a:solidFill>
+                <a:latin typeface="Arial" panose="020B0604020202020204" pitchFamily="34" charset="0"/>
+              </a:rPr>
+              <a:t>Создание индекса</a:t>
+            </a:r>
+          </a:p>
+          <a:p>
+            <a:pPr marL="0" indent="0">
+              <a:buNone/>
+            </a:pPr>
+            <a:r>
+              <a:rPr lang="en-US" sz="2400" dirty="0">
+                <a:solidFill>
+                  <a:srgbClr val="222222"/>
+                </a:solidFill>
+                <a:latin typeface="Arial" panose="020B0604020202020204" pitchFamily="34" charset="0"/>
+              </a:rPr>
+              <a:t>CREATE INDEX PK_INDEX ON Cars (ID)</a:t>
+            </a:r>
+            <a:endParaRPr lang="ru-RU" sz="2400" dirty="0">
+              <a:solidFill>
+                <a:srgbClr val="222222"/>
+              </a:solidFill>
+              <a:latin typeface="Arial" panose="020B0604020202020204" pitchFamily="34" charset="0"/>
+            </a:endParaRPr>
+          </a:p>
+          <a:p>
+            <a:r>
+              <a:rPr lang="ru-RU" sz="2400" b="0" i="0" dirty="0">
+                <a:solidFill>
+                  <a:srgbClr val="222222"/>
+                </a:solidFill>
+                <a:effectLst/>
+                <a:latin typeface="Arial" panose="020B0604020202020204" pitchFamily="34" charset="0"/>
+              </a:rPr>
+              <a:t>Вставка данных:</a:t>
+            </a:r>
+          </a:p>
+          <a:p>
+            <a:pPr marL="0" indent="0">
+              <a:buNone/>
+            </a:pPr>
+            <a:r>
+              <a:rPr lang="en-US" sz="2400" dirty="0">
+                <a:latin typeface="Arial" pitchFamily="34" charset="0"/>
+                <a:cs typeface="Arial" pitchFamily="34" charset="0"/>
+              </a:rPr>
+              <a:t>insert into cars values (5UXTA6C04N,Thurston,Olympia</a:t>
+            </a:r>
+            <a:r>
+              <a:rPr lang="ru-RU" sz="2400" dirty="0">
+                <a:latin typeface="Arial" pitchFamily="34" charset="0"/>
+                <a:cs typeface="Arial" pitchFamily="34" charset="0"/>
+              </a:rPr>
+              <a:t>…</a:t>
+            </a:r>
+            <a:endParaRPr sz="2400" dirty="0">
+              <a:latin typeface="Arial" pitchFamily="34" charset="0"/>
+              <a:cs typeface="Arial" pitchFamily="34" charset="0"/>
+            </a:endParaRPr>
+          </a:p>
+        </p:txBody>
+      </p:sp>
+    </p:spTree>
+    <p:extLst>
+      <p:ext uri="{BB962C8B-B14F-4D97-AF65-F5344CB8AC3E}">
+        <p14:creationId xmlns:p14="http://schemas.microsoft.com/office/powerpoint/2010/main" val="2997481127"/>
+      </p:ext>
+    </p:extLst>
+  </p:cSld>
+  <p:clrMapOvr>
+    <a:masterClrMapping/>
+  </p:clrMapOvr>
+  <p:transition spd="med"/>
+</p:sld>
+</file>
+
 <file path=ppt/slides/slide2.xml><?xml version="1.0" encoding="utf-8"?>
 <p:sld xmlns:a="http://schemas.openxmlformats.org/drawingml/2006/main" xmlns:r="http://schemas.openxmlformats.org/officeDocument/2006/relationships" xmlns:p="http://schemas.openxmlformats.org/presentationml/2006/main">
   <p:cSld>
@@ -4307,7 +4516,7 @@
                 <a:latin typeface="Arial" pitchFamily="34" charset="0"/>
                 <a:cs typeface="Arial" pitchFamily="34" charset="0"/>
               </a:rPr>
-              <a:t>Команды</a:t>
+              <a:t>Формат хранения дерева</a:t>
             </a:r>
             <a:endParaRPr dirty="0">
               <a:latin typeface="Arial" pitchFamily="34" charset="0"/>
@@ -4316,148 +4525,574 @@
           </a:p>
         </p:txBody>
       </p:sp>
-      <p:sp>
-        <p:nvSpPr>
-          <p:cNvPr id="4" name="Проект можно делать, а можно не делать. Например, доделывать в течение месяца домашние работы…">
+      <p:graphicFrame>
+        <p:nvGraphicFramePr>
+          <p:cNvPr id="4" name="Таблица 3">
             <a:extLst>
               <a:ext uri="{FF2B5EF4-FFF2-40B4-BE49-F238E27FC236}">
-                <a16:creationId xmlns:a16="http://schemas.microsoft.com/office/drawing/2014/main" id="{1F403D45-83A3-D37B-6960-4B3CF5B966B6}"/>
+                <a16:creationId xmlns:a16="http://schemas.microsoft.com/office/drawing/2014/main" id="{C0310901-3DBF-1740-7886-28FD9EE6F4BC}"/>
               </a:ext>
             </a:extLst>
           </p:cNvPr>
-          <p:cNvSpPr txBox="1">
-            <a:spLocks noGrp="1"/>
-          </p:cNvSpPr>
+          <p:cNvGraphicFramePr>
+            <a:graphicFrameLocks noGrp="1"/>
+          </p:cNvGraphicFramePr>
           <p:nvPr>
-            <p:ph type="body" idx="1"/>
+            <p:extLst>
+              <p:ext uri="{D42A27DB-BD31-4B8C-83A1-F6EECF244321}">
+                <p14:modId xmlns:p14="http://schemas.microsoft.com/office/powerpoint/2010/main" val="1793907059"/>
+              </p:ext>
+            </p:extLst>
           </p:nvPr>
+        </p:nvGraphicFramePr>
+        <p:xfrm>
+          <a:off x="2167466" y="1986844"/>
+          <a:ext cx="8669868" cy="1493520"/>
+        </p:xfrm>
+        <a:graphic>
+          <a:graphicData uri="http://schemas.openxmlformats.org/drawingml/2006/table">
+            <a:tbl>
+              <a:tblPr firstRow="1" bandRow="1">
+                <a:tableStyleId>{5940675A-B579-460E-94D1-54222C63F5DA}</a:tableStyleId>
+              </a:tblPr>
+              <a:tblGrid>
+                <a:gridCol w="4334934">
+                  <a:extLst>
+                    <a:ext uri="{9D8B030D-6E8A-4147-A177-3AD203B41FA5}">
+                      <a16:colId xmlns:a16="http://schemas.microsoft.com/office/drawing/2014/main" val="764310290"/>
+                    </a:ext>
+                  </a:extLst>
+                </a:gridCol>
+                <a:gridCol w="4334934">
+                  <a:extLst>
+                    <a:ext uri="{9D8B030D-6E8A-4147-A177-3AD203B41FA5}">
+                      <a16:colId xmlns:a16="http://schemas.microsoft.com/office/drawing/2014/main" val="1304152696"/>
+                    </a:ext>
+                  </a:extLst>
+                </a:gridCol>
+              </a:tblGrid>
+              <a:tr h="226814">
+                <a:tc>
+                  <a:txBody>
+                    <a:bodyPr/>
+                    <a:lstStyle/>
+                    <a:p>
+                      <a:r>
+                        <a:rPr lang="ru-RU" b="1" dirty="0"/>
+                        <a:t>Поле</a:t>
+                      </a:r>
+                      <a:endParaRPr lang="ru-RU" dirty="0"/>
+                    </a:p>
+                  </a:txBody>
+                  <a:tcPr/>
+                </a:tc>
+                <a:tc>
+                  <a:txBody>
+                    <a:bodyPr/>
+                    <a:lstStyle/>
+                    <a:p>
+                      <a:pPr marL="0" marR="0" lvl="0" indent="0" algn="ctr" defTabSz="584200" rtl="0" eaLnBrk="1" fontAlgn="auto" latinLnBrk="0" hangingPunct="1">
+                        <a:lnSpc>
+                          <a:spcPct val="100000"/>
+                        </a:lnSpc>
+                        <a:spcBef>
+                          <a:spcPts val="0"/>
+                        </a:spcBef>
+                        <a:spcAft>
+                          <a:spcPts val="0"/>
+                        </a:spcAft>
+                        <a:buClrTx/>
+                        <a:buSzTx/>
+                        <a:buFontTx/>
+                        <a:buNone/>
+                        <a:tabLst/>
+                        <a:defRPr/>
+                      </a:pPr>
+                      <a:r>
+                        <a:rPr lang="ru-RU" b="1" dirty="0"/>
+                        <a:t>Длина, байт</a:t>
+                      </a:r>
+                      <a:endParaRPr lang="ru-RU" dirty="0"/>
+                    </a:p>
+                  </a:txBody>
+                  <a:tcPr/>
+                </a:tc>
+                <a:extLst>
+                  <a:ext uri="{0D108BD9-81ED-4DB2-BD59-A6C34878D82A}">
+                    <a16:rowId xmlns:a16="http://schemas.microsoft.com/office/drawing/2014/main" val="1158383292"/>
+                  </a:ext>
+                </a:extLst>
+              </a:tr>
+              <a:tr h="226814">
+                <a:tc>
+                  <a:txBody>
+                    <a:bodyPr/>
+                    <a:lstStyle/>
+                    <a:p>
+                      <a:r>
+                        <a:rPr lang="ru-RU" dirty="0"/>
+                        <a:t>Номер блока корневого узла</a:t>
+                      </a:r>
+                    </a:p>
+                  </a:txBody>
+                  <a:tcPr/>
+                </a:tc>
+                <a:tc>
+                  <a:txBody>
+                    <a:bodyPr/>
+                    <a:lstStyle/>
+                    <a:p>
+                      <a:r>
+                        <a:rPr lang="ru-RU" dirty="0"/>
+                        <a:t>4</a:t>
+                      </a:r>
+                    </a:p>
+                  </a:txBody>
+                  <a:tcPr/>
+                </a:tc>
+                <a:extLst>
+                  <a:ext uri="{0D108BD9-81ED-4DB2-BD59-A6C34878D82A}">
+                    <a16:rowId xmlns:a16="http://schemas.microsoft.com/office/drawing/2014/main" val="361875295"/>
+                  </a:ext>
+                </a:extLst>
+              </a:tr>
+              <a:tr h="683728">
+                <a:tc gridSpan="2">
+                  <a:txBody>
+                    <a:bodyPr/>
+                    <a:lstStyle/>
+                    <a:p>
+                      <a:r>
+                        <a:rPr lang="ru-RU" dirty="0"/>
+                        <a:t>Последовательность блоков с  узлами</a:t>
+                      </a:r>
+                    </a:p>
+                    <a:p>
+                      <a:endParaRPr lang="ru-RU" dirty="0"/>
+                    </a:p>
+                    <a:p>
+                      <a:endParaRPr lang="ru-RU" dirty="0"/>
+                    </a:p>
+                  </a:txBody>
+                  <a:tcPr/>
+                </a:tc>
+                <a:tc hMerge="1">
+                  <a:txBody>
+                    <a:bodyPr/>
+                    <a:lstStyle/>
+                    <a:p>
+                      <a:endParaRPr lang="ru-RU" dirty="0"/>
+                    </a:p>
+                  </a:txBody>
+                  <a:tcPr/>
+                </a:tc>
+                <a:extLst>
+                  <a:ext uri="{0D108BD9-81ED-4DB2-BD59-A6C34878D82A}">
+                    <a16:rowId xmlns:a16="http://schemas.microsoft.com/office/drawing/2014/main" val="1563821168"/>
+                  </a:ext>
+                </a:extLst>
+              </a:tr>
+            </a:tbl>
+          </a:graphicData>
+        </a:graphic>
+      </p:graphicFrame>
+      <p:graphicFrame>
+        <p:nvGraphicFramePr>
+          <p:cNvPr id="6" name="Таблица 5">
+            <a:extLst>
+              <a:ext uri="{FF2B5EF4-FFF2-40B4-BE49-F238E27FC236}">
+                <a16:creationId xmlns:a16="http://schemas.microsoft.com/office/drawing/2014/main" id="{AA52BE0B-ED06-C460-210C-8769A19A6878}"/>
+              </a:ext>
+            </a:extLst>
+          </p:cNvPr>
+          <p:cNvGraphicFramePr>
+            <a:graphicFrameLocks noGrp="1"/>
+          </p:cNvGraphicFramePr>
+          <p:nvPr>
+            <p:extLst>
+              <p:ext uri="{D42A27DB-BD31-4B8C-83A1-F6EECF244321}">
+                <p14:modId xmlns:p14="http://schemas.microsoft.com/office/powerpoint/2010/main" val="147912077"/>
+              </p:ext>
+            </p:extLst>
+          </p:nvPr>
+        </p:nvGraphicFramePr>
+        <p:xfrm>
+          <a:off x="2311400" y="4343400"/>
+          <a:ext cx="8669868" cy="2225040"/>
+        </p:xfrm>
+        <a:graphic>
+          <a:graphicData uri="http://schemas.openxmlformats.org/drawingml/2006/table">
+            <a:tbl>
+              <a:tblPr firstRow="1" bandRow="1">
+                <a:tableStyleId>{5940675A-B579-460E-94D1-54222C63F5DA}</a:tableStyleId>
+              </a:tblPr>
+              <a:tblGrid>
+                <a:gridCol w="4334934">
+                  <a:extLst>
+                    <a:ext uri="{9D8B030D-6E8A-4147-A177-3AD203B41FA5}">
+                      <a16:colId xmlns:a16="http://schemas.microsoft.com/office/drawing/2014/main" val="652473567"/>
+                    </a:ext>
+                  </a:extLst>
+                </a:gridCol>
+                <a:gridCol w="4334934">
+                  <a:extLst>
+                    <a:ext uri="{9D8B030D-6E8A-4147-A177-3AD203B41FA5}">
+                      <a16:colId xmlns:a16="http://schemas.microsoft.com/office/drawing/2014/main" val="727247755"/>
+                    </a:ext>
+                  </a:extLst>
+                </a:gridCol>
+              </a:tblGrid>
+              <a:tr h="370840">
+                <a:tc>
+                  <a:txBody>
+                    <a:bodyPr/>
+                    <a:lstStyle/>
+                    <a:p>
+                      <a:r>
+                        <a:rPr lang="ru-RU" b="1" dirty="0"/>
+                        <a:t>Поле</a:t>
+                      </a:r>
+                    </a:p>
+                  </a:txBody>
+                  <a:tcPr/>
+                </a:tc>
+                <a:tc>
+                  <a:txBody>
+                    <a:bodyPr/>
+                    <a:lstStyle/>
+                    <a:p>
+                      <a:r>
+                        <a:rPr lang="ru-RU" b="1"/>
+                        <a:t>Длина, байт</a:t>
+                      </a:r>
+                      <a:endParaRPr lang="ru-RU" b="1" dirty="0"/>
+                    </a:p>
+                  </a:txBody>
+                  <a:tcPr/>
+                </a:tc>
+                <a:extLst>
+                  <a:ext uri="{0D108BD9-81ED-4DB2-BD59-A6C34878D82A}">
+                    <a16:rowId xmlns:a16="http://schemas.microsoft.com/office/drawing/2014/main" val="3543787069"/>
+                  </a:ext>
+                </a:extLst>
+              </a:tr>
+              <a:tr h="370840">
+                <a:tc>
+                  <a:txBody>
+                    <a:bodyPr/>
+                    <a:lstStyle/>
+                    <a:p>
+                      <a:r>
+                        <a:rPr lang="ru-RU" dirty="0"/>
+                        <a:t>Количество ключей в узле</a:t>
+                      </a:r>
+                    </a:p>
+                  </a:txBody>
+                  <a:tcPr/>
+                </a:tc>
+                <a:tc>
+                  <a:txBody>
+                    <a:bodyPr/>
+                    <a:lstStyle/>
+                    <a:p>
+                      <a:r>
+                        <a:rPr lang="ru-RU"/>
+                        <a:t>4</a:t>
+                      </a:r>
+                      <a:endParaRPr lang="ru-RU" dirty="0"/>
+                    </a:p>
+                  </a:txBody>
+                  <a:tcPr/>
+                </a:tc>
+                <a:extLst>
+                  <a:ext uri="{0D108BD9-81ED-4DB2-BD59-A6C34878D82A}">
+                    <a16:rowId xmlns:a16="http://schemas.microsoft.com/office/drawing/2014/main" val="2532190266"/>
+                  </a:ext>
+                </a:extLst>
+              </a:tr>
+              <a:tr h="370840">
+                <a:tc>
+                  <a:txBody>
+                    <a:bodyPr/>
+                    <a:lstStyle/>
+                    <a:p>
+                      <a:r>
+                        <a:rPr lang="ru-RU" dirty="0"/>
+                        <a:t>Признак листа</a:t>
+                      </a:r>
+                    </a:p>
+                  </a:txBody>
+                  <a:tcPr/>
+                </a:tc>
+                <a:tc>
+                  <a:txBody>
+                    <a:bodyPr/>
+                    <a:lstStyle/>
+                    <a:p>
+                      <a:r>
+                        <a:rPr lang="ru-RU"/>
+                        <a:t>1</a:t>
+                      </a:r>
+                      <a:endParaRPr lang="ru-RU" dirty="0"/>
+                    </a:p>
+                  </a:txBody>
+                  <a:tcPr/>
+                </a:tc>
+                <a:extLst>
+                  <a:ext uri="{0D108BD9-81ED-4DB2-BD59-A6C34878D82A}">
+                    <a16:rowId xmlns:a16="http://schemas.microsoft.com/office/drawing/2014/main" val="1353782042"/>
+                  </a:ext>
+                </a:extLst>
+              </a:tr>
+              <a:tr h="370840">
+                <a:tc>
+                  <a:txBody>
+                    <a:bodyPr/>
+                    <a:lstStyle/>
+                    <a:p>
+                      <a:r>
+                        <a:rPr lang="ru-RU" dirty="0"/>
+                        <a:t>Номера блоков дочерних узлов</a:t>
+                      </a:r>
+                    </a:p>
+                  </a:txBody>
+                  <a:tcPr/>
+                </a:tc>
+                <a:tc>
+                  <a:txBody>
+                    <a:bodyPr/>
+                    <a:lstStyle/>
+                    <a:p>
+                      <a:r>
+                        <a:rPr lang="ru-RU" dirty="0"/>
+                        <a:t>2*</a:t>
+                      </a:r>
+                      <a:r>
+                        <a:rPr lang="en-US" dirty="0"/>
+                        <a:t>t*4</a:t>
+                      </a:r>
+                      <a:r>
+                        <a:rPr lang="ru-RU" dirty="0"/>
+                        <a:t> (Степень дерева </a:t>
+                      </a:r>
+                      <a:r>
+                        <a:rPr lang="en-US" dirty="0"/>
+                        <a:t>t=</a:t>
+                      </a:r>
+                      <a:r>
+                        <a:rPr lang="ru-RU" sz="1600" b="0" i="0" u="none" strike="noStrike" cap="none" spc="0" baseline="0" dirty="0">
+                          <a:ln>
+                            <a:noFill/>
+                          </a:ln>
+                          <a:solidFill>
+                            <a:schemeClr val="tx1"/>
+                          </a:solidFill>
+                          <a:uFillTx/>
+                          <a:latin typeface="+mn-lt"/>
+                          <a:ea typeface="+mn-ea"/>
+                          <a:cs typeface="+mn-cs"/>
+                          <a:sym typeface="Helvetica Neue Light"/>
+                        </a:rPr>
+                        <a:t>128</a:t>
+                      </a:r>
+                      <a:r>
+                        <a:rPr lang="en-US" dirty="0"/>
+                        <a:t>)</a:t>
+                      </a:r>
+                      <a:endParaRPr lang="ru-RU" dirty="0"/>
+                    </a:p>
+                  </a:txBody>
+                  <a:tcPr/>
+                </a:tc>
+                <a:extLst>
+                  <a:ext uri="{0D108BD9-81ED-4DB2-BD59-A6C34878D82A}">
+                    <a16:rowId xmlns:a16="http://schemas.microsoft.com/office/drawing/2014/main" val="1656260334"/>
+                  </a:ext>
+                </a:extLst>
+              </a:tr>
+              <a:tr h="370840">
+                <a:tc>
+                  <a:txBody>
+                    <a:bodyPr/>
+                    <a:lstStyle/>
+                    <a:p>
+                      <a:r>
+                        <a:rPr lang="ru-RU"/>
+                        <a:t>Массив пар «ключ-смещение»</a:t>
+                      </a:r>
+                      <a:endParaRPr lang="ru-RU" dirty="0"/>
+                    </a:p>
+                  </a:txBody>
+                  <a:tcPr/>
+                </a:tc>
+                <a:tc>
+                  <a:txBody>
+                    <a:bodyPr/>
+                    <a:lstStyle/>
+                    <a:p>
+                      <a:r>
+                        <a:rPr lang="en-US" dirty="0"/>
+                        <a:t>(</a:t>
+                      </a:r>
+                      <a:r>
+                        <a:rPr lang="ru-RU" dirty="0"/>
+                        <a:t>2*</a:t>
+                      </a:r>
+                      <a:r>
+                        <a:rPr lang="en-US" dirty="0"/>
+                        <a:t>t-</a:t>
+                      </a:r>
+                      <a:r>
+                        <a:rPr lang="ru-RU" dirty="0"/>
+                        <a:t>1</a:t>
+                      </a:r>
+                      <a:r>
+                        <a:rPr lang="en-US" dirty="0"/>
+                        <a:t>)*4</a:t>
+                      </a:r>
+                      <a:endParaRPr lang="ru-RU" dirty="0"/>
+                    </a:p>
+                  </a:txBody>
+                  <a:tcPr/>
+                </a:tc>
+                <a:extLst>
+                  <a:ext uri="{0D108BD9-81ED-4DB2-BD59-A6C34878D82A}">
+                    <a16:rowId xmlns:a16="http://schemas.microsoft.com/office/drawing/2014/main" val="1745247738"/>
+                  </a:ext>
+                </a:extLst>
+              </a:tr>
+              <a:tr h="370840">
+                <a:tc gridSpan="2">
+                  <a:txBody>
+                    <a:bodyPr/>
+                    <a:lstStyle/>
+                    <a:p>
+                      <a:r>
+                        <a:rPr lang="ru-RU" dirty="0"/>
+                        <a:t>Выравнивание до размера </a:t>
+                      </a:r>
+                      <a:r>
+                        <a:rPr lang="en-US" dirty="0" err="1"/>
+                        <a:t>blockSize</a:t>
+                      </a:r>
+                      <a:r>
+                        <a:rPr lang="en-US" dirty="0"/>
+                        <a:t>(4096</a:t>
+                      </a:r>
+                      <a:r>
+                        <a:rPr lang="ru-RU" dirty="0"/>
+                        <a:t>байт)</a:t>
+                      </a:r>
+                    </a:p>
+                  </a:txBody>
+                  <a:tcPr/>
+                </a:tc>
+                <a:tc hMerge="1">
+                  <a:txBody>
+                    <a:bodyPr/>
+                    <a:lstStyle/>
+                    <a:p>
+                      <a:endParaRPr lang="ru-RU" dirty="0"/>
+                    </a:p>
+                  </a:txBody>
+                  <a:tcPr/>
+                </a:tc>
+                <a:extLst>
+                  <a:ext uri="{0D108BD9-81ED-4DB2-BD59-A6C34878D82A}">
+                    <a16:rowId xmlns:a16="http://schemas.microsoft.com/office/drawing/2014/main" val="2703919430"/>
+                  </a:ext>
+                </a:extLst>
+              </a:tr>
+            </a:tbl>
+          </a:graphicData>
+        </a:graphic>
+      </p:graphicFrame>
+      <p:sp>
+        <p:nvSpPr>
+          <p:cNvPr id="7" name="TextBox 6">
+            <a:extLst>
+              <a:ext uri="{FF2B5EF4-FFF2-40B4-BE49-F238E27FC236}">
+                <a16:creationId xmlns:a16="http://schemas.microsoft.com/office/drawing/2014/main" id="{C1D4C9DD-288D-485C-9C8F-A15F589F5404}"/>
+              </a:ext>
+            </a:extLst>
+          </p:cNvPr>
+          <p:cNvSpPr txBox="1"/>
+          <p:nvPr/>
         </p:nvSpPr>
         <p:spPr>
           <a:xfrm>
-            <a:off x="2006600" y="2819400"/>
-            <a:ext cx="11099800" cy="1947949"/>
+            <a:off x="4597400" y="3726438"/>
+            <a:ext cx="3352800" cy="471924"/>
           </a:xfrm>
           <a:prstGeom prst="rect">
             <a:avLst/>
           </a:prstGeom>
+          <a:noFill/>
+          <a:ln w="12700" cap="flat">
+            <a:noFill/>
+            <a:miter lim="400000"/>
+          </a:ln>
+          <a:effectLst/>
+          <a:sp3d/>
         </p:spPr>
+        <p:style>
+          <a:lnRef idx="0">
+            <a:scrgbClr r="0" g="0" b="0"/>
+          </a:lnRef>
+          <a:fillRef idx="0">
+            <a:scrgbClr r="0" g="0" b="0"/>
+          </a:fillRef>
+          <a:effectRef idx="0">
+            <a:scrgbClr r="0" g="0" b="0"/>
+          </a:effectRef>
+          <a:fontRef idx="none"/>
+        </p:style>
         <p:txBody>
-          <a:bodyPr>
-            <a:noAutofit/>
+          <a:bodyPr rot="0" spcFirstLastPara="1" vertOverflow="overflow" horzOverflow="overflow" vert="horz" wrap="square" lIns="50800" tIns="50800" rIns="50800" bIns="50800" numCol="1" spcCol="38100" rtlCol="0" anchor="ctr">
+            <a:spAutoFit/>
           </a:bodyPr>
           <a:lstStyle/>
           <a:p>
-            <a:endParaRPr lang="ru-RU" sz="2400" b="0" i="0" dirty="0">
-              <a:solidFill>
-                <a:srgbClr val="222222"/>
-              </a:solidFill>
-              <a:effectLst/>
-              <a:latin typeface="Arial" panose="020B0604020202020204" pitchFamily="34" charset="0"/>
-            </a:endParaRPr>
-          </a:p>
-          <a:p>
-            <a:r>
-              <a:rPr lang="ru-RU" sz="2400" dirty="0">
+            <a:pPr marL="0" marR="0" indent="0" algn="ctr" defTabSz="584200" rtl="0" fontAlgn="auto" latinLnBrk="0" hangingPunct="0">
+              <a:lnSpc>
+                <a:spcPct val="100000"/>
+              </a:lnSpc>
+              <a:spcBef>
+                <a:spcPts val="0"/>
+              </a:spcBef>
+              <a:spcAft>
+                <a:spcPts val="0"/>
+              </a:spcAft>
+              <a:buClrTx/>
+              <a:buSzTx/>
+              <a:buFontTx/>
+              <a:buNone/>
+              <a:tabLst/>
+            </a:pPr>
+            <a:r>
+              <a:rPr kumimoji="0" lang="ru-RU" sz="2400" b="0" i="0" u="none" strike="noStrike" cap="none" spc="0" normalizeH="0" baseline="0" dirty="0">
+                <a:ln>
+                  <a:noFill/>
+                </a:ln>
                 <a:solidFill>
-                  <a:srgbClr val="222222"/>
-                </a:solidFill>
-                <a:latin typeface="Arial" panose="020B0604020202020204" pitchFamily="34" charset="0"/>
-              </a:rPr>
-              <a:t>Выборка данных:</a:t>
-            </a:r>
-          </a:p>
-          <a:p>
-            <a:pPr marL="0" indent="0">
-              <a:buNone/>
-            </a:pPr>
-            <a:r>
-              <a:rPr lang="en-US" sz="2400" dirty="0">
-                <a:solidFill>
-                  <a:srgbClr val="222222"/>
-                </a:solidFill>
-                <a:latin typeface="Arial" panose="020B0604020202020204" pitchFamily="34" charset="0"/>
-              </a:rPr>
-              <a:t>select * from Cars where ID = 5</a:t>
-            </a:r>
-            <a:endParaRPr lang="ru-RU" sz="2400" dirty="0">
-              <a:solidFill>
-                <a:srgbClr val="222222"/>
-              </a:solidFill>
-              <a:latin typeface="Arial" panose="020B0604020202020204" pitchFamily="34" charset="0"/>
-            </a:endParaRPr>
-          </a:p>
-          <a:p>
-            <a:r>
-              <a:rPr lang="ru-RU" sz="2400" dirty="0">
-                <a:solidFill>
-                  <a:srgbClr val="222222"/>
-                </a:solidFill>
-                <a:latin typeface="Arial" panose="020B0604020202020204" pitchFamily="34" charset="0"/>
-              </a:rPr>
-              <a:t>Создание индекса</a:t>
-            </a:r>
-          </a:p>
-          <a:p>
-            <a:pPr marL="0" indent="0">
-              <a:buNone/>
-            </a:pPr>
-            <a:r>
-              <a:rPr lang="en-US" sz="2400" dirty="0">
-                <a:solidFill>
-                  <a:srgbClr val="222222"/>
-                </a:solidFill>
-                <a:latin typeface="Arial" panose="020B0604020202020204" pitchFamily="34" charset="0"/>
-              </a:rPr>
-              <a:t>CREATE INDEX PK_INDEX ON Cars (ID)</a:t>
-            </a:r>
-            <a:endParaRPr lang="ru-RU" sz="2400" dirty="0">
-              <a:solidFill>
-                <a:srgbClr val="222222"/>
-              </a:solidFill>
-              <a:latin typeface="Arial" panose="020B0604020202020204" pitchFamily="34" charset="0"/>
-            </a:endParaRPr>
-          </a:p>
-          <a:p>
-            <a:r>
-              <a:rPr lang="ru-RU" sz="2400" b="0" i="0" dirty="0">
-                <a:solidFill>
-                  <a:srgbClr val="222222"/>
+                  <a:srgbClr val="000000"/>
                 </a:solidFill>
                 <a:effectLst/>
-                <a:latin typeface="Arial" panose="020B0604020202020204" pitchFamily="34" charset="0"/>
+                <a:uFillTx/>
+                <a:latin typeface="Helvetica Neue Medium"/>
+                <a:ea typeface="Helvetica Neue Medium"/>
+                <a:cs typeface="Helvetica Neue Medium"/>
+                <a:sym typeface="Helvetica Neue Medium"/>
               </a:rPr>
-              <a:t>Вставка данных:</a:t>
-            </a:r>
-          </a:p>
-          <a:p>
-            <a:pPr marL="0" indent="0">
-              <a:buNone/>
-            </a:pPr>
-            <a:r>
-              <a:rPr lang="en-US" sz="2400" dirty="0">
-                <a:latin typeface="Arial" pitchFamily="34" charset="0"/>
-                <a:cs typeface="Arial" pitchFamily="34" charset="0"/>
-              </a:rPr>
-              <a:t>insert into cars values (5UXTA6C04N,Thurston,Olympia</a:t>
-            </a:r>
-            <a:r>
-              <a:rPr lang="ru-RU" sz="2400" dirty="0">
-                <a:latin typeface="Arial" pitchFamily="34" charset="0"/>
-                <a:cs typeface="Arial" pitchFamily="34" charset="0"/>
-              </a:rPr>
-              <a:t>…</a:t>
-            </a:r>
-            <a:endParaRPr sz="2400" dirty="0">
-              <a:latin typeface="Arial" pitchFamily="34" charset="0"/>
-              <a:cs typeface="Arial" pitchFamily="34" charset="0"/>
-            </a:endParaRPr>
+              <a:t>Формат блока узла</a:t>
+            </a:r>
           </a:p>
         </p:txBody>
       </p:sp>
     </p:spTree>
     <p:extLst>
       <p:ext uri="{BB962C8B-B14F-4D97-AF65-F5344CB8AC3E}">
-        <p14:creationId xmlns:p14="http://schemas.microsoft.com/office/powerpoint/2010/main" val="2997481127"/>
+        <p14:creationId xmlns:p14="http://schemas.microsoft.com/office/powerpoint/2010/main" val="2474290873"/>
       </p:ext>
     </p:extLst>
   </p:cSld>

</xml_diff>